<commit_message>
3. hafta ders baslangici
</commit_message>
<xml_diff>
--- a/sunumlar/06_Hata_Matrisi_Yorumlama+.pptx
+++ b/sunumlar/06_Hata_Matrisi_Yorumlama+.pptx
@@ -5,7 +5,7 @@
     <p:sldMasterId id="2147483648" r:id="rId1"/>
   </p:sldMasterIdLst>
   <p:notesMasterIdLst>
-    <p:notesMasterId r:id="rId14"/>
+    <p:notesMasterId r:id="rId15"/>
   </p:notesMasterIdLst>
   <p:sldIdLst>
     <p:sldId id="257" r:id="rId2"/>
@@ -20,6 +20,7 @@
     <p:sldId id="332" r:id="rId11"/>
     <p:sldId id="333" r:id="rId12"/>
     <p:sldId id="334" r:id="rId13"/>
+    <p:sldId id="335" r:id="rId14"/>
   </p:sldIdLst>
   <p:sldSz cx="12192000" cy="6858000"/>
   <p:notesSz cx="6858000" cy="9144000"/>
@@ -6636,10 +6637,4012 @@
           </a:fontRef>
         </p:style>
       </p:cxnSp>
+      <p:graphicFrame>
+        <p:nvGraphicFramePr>
+          <p:cNvPr id="2" name="Tablo 1">
+            <a:extLst>
+              <a:ext uri="{FF2B5EF4-FFF2-40B4-BE49-F238E27FC236}">
+                <a16:creationId xmlns:a16="http://schemas.microsoft.com/office/drawing/2014/main" id="{C1D1035A-8400-4AF7-8B15-52C4E0DC20F9}"/>
+              </a:ext>
+            </a:extLst>
+          </p:cNvPr>
+          <p:cNvGraphicFramePr>
+            <a:graphicFrameLocks noGrp="1"/>
+          </p:cNvGraphicFramePr>
+          <p:nvPr>
+            <p:extLst>
+              <p:ext uri="{D42A27DB-BD31-4B8C-83A1-F6EECF244321}">
+                <p14:modId xmlns:p14="http://schemas.microsoft.com/office/powerpoint/2010/main" val="708348701"/>
+              </p:ext>
+            </p:extLst>
+          </p:nvPr>
+        </p:nvGraphicFramePr>
+        <p:xfrm>
+          <a:off x="2296632" y="1073892"/>
+          <a:ext cx="7336464" cy="3304244"/>
+        </p:xfrm>
+        <a:graphic>
+          <a:graphicData uri="http://schemas.openxmlformats.org/drawingml/2006/table">
+            <a:tbl>
+              <a:tblPr>
+                <a:tableStyleId>{5C22544A-7EE6-4342-B048-85BDC9FD1C3A}</a:tableStyleId>
+              </a:tblPr>
+              <a:tblGrid>
+                <a:gridCol w="917058">
+                  <a:extLst>
+                    <a:ext uri="{9D8B030D-6E8A-4147-A177-3AD203B41FA5}">
+                      <a16:colId xmlns:a16="http://schemas.microsoft.com/office/drawing/2014/main" val="1766416363"/>
+                    </a:ext>
+                  </a:extLst>
+                </a:gridCol>
+                <a:gridCol w="917058">
+                  <a:extLst>
+                    <a:ext uri="{9D8B030D-6E8A-4147-A177-3AD203B41FA5}">
+                      <a16:colId xmlns:a16="http://schemas.microsoft.com/office/drawing/2014/main" val="3835423214"/>
+                    </a:ext>
+                  </a:extLst>
+                </a:gridCol>
+                <a:gridCol w="917058">
+                  <a:extLst>
+                    <a:ext uri="{9D8B030D-6E8A-4147-A177-3AD203B41FA5}">
+                      <a16:colId xmlns:a16="http://schemas.microsoft.com/office/drawing/2014/main" val="981778702"/>
+                    </a:ext>
+                  </a:extLst>
+                </a:gridCol>
+                <a:gridCol w="917058">
+                  <a:extLst>
+                    <a:ext uri="{9D8B030D-6E8A-4147-A177-3AD203B41FA5}">
+                      <a16:colId xmlns:a16="http://schemas.microsoft.com/office/drawing/2014/main" val="3653129618"/>
+                    </a:ext>
+                  </a:extLst>
+                </a:gridCol>
+                <a:gridCol w="917058">
+                  <a:extLst>
+                    <a:ext uri="{9D8B030D-6E8A-4147-A177-3AD203B41FA5}">
+                      <a16:colId xmlns:a16="http://schemas.microsoft.com/office/drawing/2014/main" val="2178438715"/>
+                    </a:ext>
+                  </a:extLst>
+                </a:gridCol>
+                <a:gridCol w="917058">
+                  <a:extLst>
+                    <a:ext uri="{9D8B030D-6E8A-4147-A177-3AD203B41FA5}">
+                      <a16:colId xmlns:a16="http://schemas.microsoft.com/office/drawing/2014/main" val="1088184401"/>
+                    </a:ext>
+                  </a:extLst>
+                </a:gridCol>
+                <a:gridCol w="917058">
+                  <a:extLst>
+                    <a:ext uri="{9D8B030D-6E8A-4147-A177-3AD203B41FA5}">
+                      <a16:colId xmlns:a16="http://schemas.microsoft.com/office/drawing/2014/main" val="1301119639"/>
+                    </a:ext>
+                  </a:extLst>
+                </a:gridCol>
+                <a:gridCol w="917058">
+                  <a:extLst>
+                    <a:ext uri="{9D8B030D-6E8A-4147-A177-3AD203B41FA5}">
+                      <a16:colId xmlns:a16="http://schemas.microsoft.com/office/drawing/2014/main" val="760277851"/>
+                    </a:ext>
+                  </a:extLst>
+                </a:gridCol>
+              </a:tblGrid>
+              <a:tr h="393401">
+                <a:tc>
+                  <a:txBody>
+                    <a:bodyPr/>
+                    <a:lstStyle/>
+                    <a:p>
+                      <a:pPr algn="l" fontAlgn="b"/>
+                      <a:r>
+                        <a:rPr lang="tr-TR" sz="1600" u="none" strike="noStrike">
+                          <a:effectLst/>
+                        </a:rPr>
+                        <a:t>Eşik: 0.5</a:t>
+                      </a:r>
+                      <a:endParaRPr lang="tr-TR" sz="1600" b="0" i="0" u="none" strike="noStrike">
+                        <a:solidFill>
+                          <a:srgbClr val="000000"/>
+                        </a:solidFill>
+                        <a:effectLst/>
+                        <a:latin typeface="Calibri" panose="020F0502020204030204" pitchFamily="34" charset="0"/>
+                      </a:endParaRPr>
+                    </a:p>
+                  </a:txBody>
+                  <a:tcPr marL="9525" marR="9525" marT="9525" marB="0" anchor="b">
+                    <a:lnB w="12700" cap="flat" cmpd="sng" algn="ctr">
+                      <a:solidFill>
+                        <a:schemeClr val="tx1"/>
+                      </a:solidFill>
+                      <a:prstDash val="solid"/>
+                      <a:round/>
+                      <a:headEnd type="none" w="med" len="med"/>
+                      <a:tailEnd type="none" w="med" len="med"/>
+                    </a:lnB>
+                  </a:tcPr>
+                </a:tc>
+                <a:tc>
+                  <a:txBody>
+                    <a:bodyPr/>
+                    <a:lstStyle/>
+                    <a:p>
+                      <a:pPr algn="l" fontAlgn="b"/>
+                      <a:endParaRPr lang="tr-TR" sz="1600" b="0" i="0" u="none" strike="noStrike">
+                        <a:solidFill>
+                          <a:srgbClr val="000000"/>
+                        </a:solidFill>
+                        <a:effectLst/>
+                        <a:latin typeface="Calibri" panose="020F0502020204030204" pitchFamily="34" charset="0"/>
+                      </a:endParaRPr>
+                    </a:p>
+                  </a:txBody>
+                  <a:tcPr marL="9525" marR="9525" marT="9525" marB="0" anchor="b">
+                    <a:lnB w="12700" cap="flat" cmpd="sng" algn="ctr">
+                      <a:solidFill>
+                        <a:schemeClr val="tx1"/>
+                      </a:solidFill>
+                      <a:prstDash val="solid"/>
+                      <a:round/>
+                      <a:headEnd type="none" w="med" len="med"/>
+                      <a:tailEnd type="none" w="med" len="med"/>
+                    </a:lnB>
+                  </a:tcPr>
+                </a:tc>
+                <a:tc>
+                  <a:txBody>
+                    <a:bodyPr/>
+                    <a:lstStyle/>
+                    <a:p>
+                      <a:pPr algn="l" fontAlgn="b"/>
+                      <a:endParaRPr lang="tr-TR" sz="1600" b="0" i="0" u="none" strike="noStrike">
+                        <a:solidFill>
+                          <a:srgbClr val="000000"/>
+                        </a:solidFill>
+                        <a:effectLst/>
+                        <a:latin typeface="Calibri" panose="020F0502020204030204" pitchFamily="34" charset="0"/>
+                      </a:endParaRPr>
+                    </a:p>
+                  </a:txBody>
+                  <a:tcPr marL="9525" marR="9525" marT="9525" marB="0" anchor="b"/>
+                </a:tc>
+                <a:tc>
+                  <a:txBody>
+                    <a:bodyPr/>
+                    <a:lstStyle/>
+                    <a:p>
+                      <a:pPr algn="l" fontAlgn="b"/>
+                      <a:r>
+                        <a:rPr lang="tr-TR" sz="1600" u="none" strike="noStrike" dirty="0">
+                          <a:effectLst/>
+                        </a:rPr>
+                        <a:t>Eşik: 0.3</a:t>
+                      </a:r>
+                      <a:endParaRPr lang="tr-TR" sz="1600" b="0" i="0" u="none" strike="noStrike" dirty="0">
+                        <a:solidFill>
+                          <a:srgbClr val="000000"/>
+                        </a:solidFill>
+                        <a:effectLst/>
+                        <a:latin typeface="Calibri" panose="020F0502020204030204" pitchFamily="34" charset="0"/>
+                      </a:endParaRPr>
+                    </a:p>
+                  </a:txBody>
+                  <a:tcPr marL="9525" marR="9525" marT="9525" marB="0" anchor="b">
+                    <a:lnB w="12700" cap="flat" cmpd="sng" algn="ctr">
+                      <a:solidFill>
+                        <a:schemeClr val="tx1"/>
+                      </a:solidFill>
+                      <a:prstDash val="solid"/>
+                      <a:round/>
+                      <a:headEnd type="none" w="med" len="med"/>
+                      <a:tailEnd type="none" w="med" len="med"/>
+                    </a:lnB>
+                  </a:tcPr>
+                </a:tc>
+                <a:tc>
+                  <a:txBody>
+                    <a:bodyPr/>
+                    <a:lstStyle/>
+                    <a:p>
+                      <a:pPr algn="l" fontAlgn="b"/>
+                      <a:endParaRPr lang="tr-TR" sz="1600" b="0" i="0" u="none" strike="noStrike">
+                        <a:solidFill>
+                          <a:srgbClr val="000000"/>
+                        </a:solidFill>
+                        <a:effectLst/>
+                        <a:latin typeface="Calibri" panose="020F0502020204030204" pitchFamily="34" charset="0"/>
+                      </a:endParaRPr>
+                    </a:p>
+                  </a:txBody>
+                  <a:tcPr marL="9525" marR="9525" marT="9525" marB="0" anchor="b">
+                    <a:lnB w="12700" cap="flat" cmpd="sng" algn="ctr">
+                      <a:solidFill>
+                        <a:schemeClr val="tx1"/>
+                      </a:solidFill>
+                      <a:prstDash val="solid"/>
+                      <a:round/>
+                      <a:headEnd type="none" w="med" len="med"/>
+                      <a:tailEnd type="none" w="med" len="med"/>
+                    </a:lnB>
+                  </a:tcPr>
+                </a:tc>
+                <a:tc>
+                  <a:txBody>
+                    <a:bodyPr/>
+                    <a:lstStyle/>
+                    <a:p>
+                      <a:pPr algn="l" fontAlgn="b"/>
+                      <a:endParaRPr lang="tr-TR" sz="1600" b="0" i="0" u="none" strike="noStrike">
+                        <a:solidFill>
+                          <a:srgbClr val="000000"/>
+                        </a:solidFill>
+                        <a:effectLst/>
+                        <a:latin typeface="Calibri" panose="020F0502020204030204" pitchFamily="34" charset="0"/>
+                      </a:endParaRPr>
+                    </a:p>
+                  </a:txBody>
+                  <a:tcPr marL="9525" marR="9525" marT="9525" marB="0" anchor="b"/>
+                </a:tc>
+                <a:tc>
+                  <a:txBody>
+                    <a:bodyPr/>
+                    <a:lstStyle/>
+                    <a:p>
+                      <a:pPr algn="l" fontAlgn="b"/>
+                      <a:r>
+                        <a:rPr lang="tr-TR" sz="1600" u="none" strike="noStrike">
+                          <a:effectLst/>
+                        </a:rPr>
+                        <a:t>Eşik: 0.7</a:t>
+                      </a:r>
+                      <a:endParaRPr lang="tr-TR" sz="1600" b="0" i="0" u="none" strike="noStrike">
+                        <a:solidFill>
+                          <a:srgbClr val="000000"/>
+                        </a:solidFill>
+                        <a:effectLst/>
+                        <a:latin typeface="Calibri" panose="020F0502020204030204" pitchFamily="34" charset="0"/>
+                      </a:endParaRPr>
+                    </a:p>
+                  </a:txBody>
+                  <a:tcPr marL="9525" marR="9525" marT="9525" marB="0" anchor="b">
+                    <a:lnB w="12700" cap="flat" cmpd="sng" algn="ctr">
+                      <a:solidFill>
+                        <a:schemeClr val="tx1"/>
+                      </a:solidFill>
+                      <a:prstDash val="solid"/>
+                      <a:round/>
+                      <a:headEnd type="none" w="med" len="med"/>
+                      <a:tailEnd type="none" w="med" len="med"/>
+                    </a:lnB>
+                  </a:tcPr>
+                </a:tc>
+                <a:tc>
+                  <a:txBody>
+                    <a:bodyPr/>
+                    <a:lstStyle/>
+                    <a:p>
+                      <a:pPr algn="l" fontAlgn="b"/>
+                      <a:endParaRPr lang="tr-TR" sz="1600" b="0" i="0" u="none" strike="noStrike">
+                        <a:solidFill>
+                          <a:srgbClr val="000000"/>
+                        </a:solidFill>
+                        <a:effectLst/>
+                        <a:latin typeface="Calibri" panose="020F0502020204030204" pitchFamily="34" charset="0"/>
+                      </a:endParaRPr>
+                    </a:p>
+                  </a:txBody>
+                  <a:tcPr marL="9525" marR="9525" marT="9525" marB="0" anchor="b">
+                    <a:lnB w="12700" cap="flat" cmpd="sng" algn="ctr">
+                      <a:solidFill>
+                        <a:schemeClr val="tx1"/>
+                      </a:solidFill>
+                      <a:prstDash val="solid"/>
+                      <a:round/>
+                      <a:headEnd type="none" w="med" len="med"/>
+                      <a:tailEnd type="none" w="med" len="med"/>
+                    </a:lnB>
+                  </a:tcPr>
+                </a:tc>
+                <a:extLst>
+                  <a:ext uri="{0D108BD9-81ED-4DB2-BD59-A6C34878D82A}">
+                    <a16:rowId xmlns:a16="http://schemas.microsoft.com/office/drawing/2014/main" val="312236614"/>
+                  </a:ext>
+                </a:extLst>
+              </a:tr>
+              <a:tr h="267050">
+                <a:tc>
+                  <a:txBody>
+                    <a:bodyPr/>
+                    <a:lstStyle/>
+                    <a:p>
+                      <a:pPr algn="l" fontAlgn="b"/>
+                      <a:r>
+                        <a:rPr lang="tr-TR" sz="1600" u="none" strike="noStrike" dirty="0">
+                          <a:effectLst/>
+                        </a:rPr>
+                        <a:t>TP</a:t>
+                      </a:r>
+                      <a:endParaRPr lang="tr-TR" sz="1600" b="0" i="0" u="none" strike="noStrike" dirty="0">
+                        <a:solidFill>
+                          <a:srgbClr val="000000"/>
+                        </a:solidFill>
+                        <a:effectLst/>
+                        <a:latin typeface="Calibri" panose="020F0502020204030204" pitchFamily="34" charset="0"/>
+                      </a:endParaRPr>
+                    </a:p>
+                  </a:txBody>
+                  <a:tcPr marL="9525" marR="9525" marT="9525" marB="0" anchor="b">
+                    <a:lnL w="12700" cap="flat" cmpd="sng" algn="ctr">
+                      <a:solidFill>
+                        <a:schemeClr val="tx1"/>
+                      </a:solidFill>
+                      <a:prstDash val="solid"/>
+                      <a:round/>
+                      <a:headEnd type="none" w="med" len="med"/>
+                      <a:tailEnd type="none" w="med" len="med"/>
+                    </a:lnL>
+                    <a:lnR w="12700" cap="flat" cmpd="sng" algn="ctr">
+                      <a:solidFill>
+                        <a:schemeClr val="tx1"/>
+                      </a:solidFill>
+                      <a:prstDash val="solid"/>
+                      <a:round/>
+                      <a:headEnd type="none" w="med" len="med"/>
+                      <a:tailEnd type="none" w="med" len="med"/>
+                    </a:lnR>
+                    <a:lnT w="12700" cap="flat" cmpd="sng" algn="ctr">
+                      <a:solidFill>
+                        <a:schemeClr val="tx1"/>
+                      </a:solidFill>
+                      <a:prstDash val="solid"/>
+                      <a:round/>
+                      <a:headEnd type="none" w="med" len="med"/>
+                      <a:tailEnd type="none" w="med" len="med"/>
+                    </a:lnT>
+                    <a:lnB w="12700" cap="flat" cmpd="sng" algn="ctr">
+                      <a:solidFill>
+                        <a:schemeClr val="tx1"/>
+                      </a:solidFill>
+                      <a:prstDash val="solid"/>
+                      <a:round/>
+                      <a:headEnd type="none" w="med" len="med"/>
+                      <a:tailEnd type="none" w="med" len="med"/>
+                    </a:lnB>
+                  </a:tcPr>
+                </a:tc>
+                <a:tc>
+                  <a:txBody>
+                    <a:bodyPr/>
+                    <a:lstStyle/>
+                    <a:p>
+                      <a:pPr algn="r" fontAlgn="b"/>
+                      <a:r>
+                        <a:rPr lang="tr-TR" sz="1600" u="none" strike="noStrike">
+                          <a:effectLst/>
+                        </a:rPr>
+                        <a:t>9</a:t>
+                      </a:r>
+                      <a:endParaRPr lang="tr-TR" sz="1600" b="0" i="0" u="none" strike="noStrike">
+                        <a:solidFill>
+                          <a:srgbClr val="000000"/>
+                        </a:solidFill>
+                        <a:effectLst/>
+                        <a:latin typeface="Calibri" panose="020F0502020204030204" pitchFamily="34" charset="0"/>
+                      </a:endParaRPr>
+                    </a:p>
+                  </a:txBody>
+                  <a:tcPr marL="9525" marR="9525" marT="9525" marB="0" anchor="b">
+                    <a:lnL w="12700" cap="flat" cmpd="sng" algn="ctr">
+                      <a:solidFill>
+                        <a:schemeClr val="tx1"/>
+                      </a:solidFill>
+                      <a:prstDash val="solid"/>
+                      <a:round/>
+                      <a:headEnd type="none" w="med" len="med"/>
+                      <a:tailEnd type="none" w="med" len="med"/>
+                    </a:lnL>
+                    <a:lnR w="12700" cap="flat" cmpd="sng" algn="ctr">
+                      <a:solidFill>
+                        <a:schemeClr val="tx1"/>
+                      </a:solidFill>
+                      <a:prstDash val="solid"/>
+                      <a:round/>
+                      <a:headEnd type="none" w="med" len="med"/>
+                      <a:tailEnd type="none" w="med" len="med"/>
+                    </a:lnR>
+                    <a:lnT w="12700" cap="flat" cmpd="sng" algn="ctr">
+                      <a:solidFill>
+                        <a:schemeClr val="tx1"/>
+                      </a:solidFill>
+                      <a:prstDash val="solid"/>
+                      <a:round/>
+                      <a:headEnd type="none" w="med" len="med"/>
+                      <a:tailEnd type="none" w="med" len="med"/>
+                    </a:lnT>
+                    <a:lnB w="12700" cap="flat" cmpd="sng" algn="ctr">
+                      <a:solidFill>
+                        <a:schemeClr val="tx1"/>
+                      </a:solidFill>
+                      <a:prstDash val="solid"/>
+                      <a:round/>
+                      <a:headEnd type="none" w="med" len="med"/>
+                      <a:tailEnd type="none" w="med" len="med"/>
+                    </a:lnB>
+                  </a:tcPr>
+                </a:tc>
+                <a:tc>
+                  <a:txBody>
+                    <a:bodyPr/>
+                    <a:lstStyle/>
+                    <a:p>
+                      <a:pPr algn="l" fontAlgn="b"/>
+                      <a:endParaRPr lang="tr-TR" sz="1600" b="0" i="0" u="none" strike="noStrike">
+                        <a:solidFill>
+                          <a:srgbClr val="000000"/>
+                        </a:solidFill>
+                        <a:effectLst/>
+                        <a:latin typeface="Calibri" panose="020F0502020204030204" pitchFamily="34" charset="0"/>
+                      </a:endParaRPr>
+                    </a:p>
+                  </a:txBody>
+                  <a:tcPr marL="9525" marR="9525" marT="9525" marB="0" anchor="b">
+                    <a:lnL w="12700" cap="flat" cmpd="sng" algn="ctr">
+                      <a:solidFill>
+                        <a:schemeClr val="tx1"/>
+                      </a:solidFill>
+                      <a:prstDash val="solid"/>
+                      <a:round/>
+                      <a:headEnd type="none" w="med" len="med"/>
+                      <a:tailEnd type="none" w="med" len="med"/>
+                    </a:lnL>
+                    <a:lnR w="12700" cap="flat" cmpd="sng" algn="ctr">
+                      <a:solidFill>
+                        <a:schemeClr val="tx1"/>
+                      </a:solidFill>
+                      <a:prstDash val="solid"/>
+                      <a:round/>
+                      <a:headEnd type="none" w="med" len="med"/>
+                      <a:tailEnd type="none" w="med" len="med"/>
+                    </a:lnR>
+                  </a:tcPr>
+                </a:tc>
+                <a:tc>
+                  <a:txBody>
+                    <a:bodyPr/>
+                    <a:lstStyle/>
+                    <a:p>
+                      <a:pPr algn="l" fontAlgn="b"/>
+                      <a:r>
+                        <a:rPr lang="tr-TR" sz="1600" u="none" strike="noStrike" dirty="0">
+                          <a:effectLst/>
+                        </a:rPr>
+                        <a:t>TP</a:t>
+                      </a:r>
+                      <a:endParaRPr lang="tr-TR" sz="1600" b="0" i="0" u="none" strike="noStrike" dirty="0">
+                        <a:solidFill>
+                          <a:srgbClr val="000000"/>
+                        </a:solidFill>
+                        <a:effectLst/>
+                        <a:latin typeface="Calibri" panose="020F0502020204030204" pitchFamily="34" charset="0"/>
+                      </a:endParaRPr>
+                    </a:p>
+                  </a:txBody>
+                  <a:tcPr marL="9525" marR="9525" marT="9525" marB="0" anchor="b">
+                    <a:lnL w="12700" cap="flat" cmpd="sng" algn="ctr">
+                      <a:solidFill>
+                        <a:schemeClr val="tx1"/>
+                      </a:solidFill>
+                      <a:prstDash val="solid"/>
+                      <a:round/>
+                      <a:headEnd type="none" w="med" len="med"/>
+                      <a:tailEnd type="none" w="med" len="med"/>
+                    </a:lnL>
+                    <a:lnR w="12700" cap="flat" cmpd="sng" algn="ctr">
+                      <a:solidFill>
+                        <a:schemeClr val="tx1"/>
+                      </a:solidFill>
+                      <a:prstDash val="solid"/>
+                      <a:round/>
+                      <a:headEnd type="none" w="med" len="med"/>
+                      <a:tailEnd type="none" w="med" len="med"/>
+                    </a:lnR>
+                    <a:lnT w="12700" cap="flat" cmpd="sng" algn="ctr">
+                      <a:solidFill>
+                        <a:schemeClr val="tx1"/>
+                      </a:solidFill>
+                      <a:prstDash val="solid"/>
+                      <a:round/>
+                      <a:headEnd type="none" w="med" len="med"/>
+                      <a:tailEnd type="none" w="med" len="med"/>
+                    </a:lnT>
+                    <a:lnB w="12700" cap="flat" cmpd="sng" algn="ctr">
+                      <a:solidFill>
+                        <a:schemeClr val="tx1"/>
+                      </a:solidFill>
+                      <a:prstDash val="solid"/>
+                      <a:round/>
+                      <a:headEnd type="none" w="med" len="med"/>
+                      <a:tailEnd type="none" w="med" len="med"/>
+                    </a:lnB>
+                  </a:tcPr>
+                </a:tc>
+                <a:tc>
+                  <a:txBody>
+                    <a:bodyPr/>
+                    <a:lstStyle/>
+                    <a:p>
+                      <a:pPr algn="r" fontAlgn="b"/>
+                      <a:r>
+                        <a:rPr lang="tr-TR" sz="1600" u="none" strike="noStrike">
+                          <a:effectLst/>
+                        </a:rPr>
+                        <a:t>10</a:t>
+                      </a:r>
+                      <a:endParaRPr lang="tr-TR" sz="1600" b="0" i="0" u="none" strike="noStrike">
+                        <a:solidFill>
+                          <a:srgbClr val="000000"/>
+                        </a:solidFill>
+                        <a:effectLst/>
+                        <a:latin typeface="Calibri" panose="020F0502020204030204" pitchFamily="34" charset="0"/>
+                      </a:endParaRPr>
+                    </a:p>
+                  </a:txBody>
+                  <a:tcPr marL="9525" marR="9525" marT="9525" marB="0" anchor="b">
+                    <a:lnL w="12700" cap="flat" cmpd="sng" algn="ctr">
+                      <a:solidFill>
+                        <a:schemeClr val="tx1"/>
+                      </a:solidFill>
+                      <a:prstDash val="solid"/>
+                      <a:round/>
+                      <a:headEnd type="none" w="med" len="med"/>
+                      <a:tailEnd type="none" w="med" len="med"/>
+                    </a:lnL>
+                    <a:lnR w="12700" cap="flat" cmpd="sng" algn="ctr">
+                      <a:solidFill>
+                        <a:schemeClr val="tx1"/>
+                      </a:solidFill>
+                      <a:prstDash val="solid"/>
+                      <a:round/>
+                      <a:headEnd type="none" w="med" len="med"/>
+                      <a:tailEnd type="none" w="med" len="med"/>
+                    </a:lnR>
+                    <a:lnT w="12700" cap="flat" cmpd="sng" algn="ctr">
+                      <a:solidFill>
+                        <a:schemeClr val="tx1"/>
+                      </a:solidFill>
+                      <a:prstDash val="solid"/>
+                      <a:round/>
+                      <a:headEnd type="none" w="med" len="med"/>
+                      <a:tailEnd type="none" w="med" len="med"/>
+                    </a:lnT>
+                    <a:lnB w="12700" cap="flat" cmpd="sng" algn="ctr">
+                      <a:solidFill>
+                        <a:schemeClr val="tx1"/>
+                      </a:solidFill>
+                      <a:prstDash val="solid"/>
+                      <a:round/>
+                      <a:headEnd type="none" w="med" len="med"/>
+                      <a:tailEnd type="none" w="med" len="med"/>
+                    </a:lnB>
+                  </a:tcPr>
+                </a:tc>
+                <a:tc>
+                  <a:txBody>
+                    <a:bodyPr/>
+                    <a:lstStyle/>
+                    <a:p>
+                      <a:pPr algn="l" fontAlgn="b"/>
+                      <a:endParaRPr lang="tr-TR" sz="1600" b="0" i="0" u="none" strike="noStrike">
+                        <a:solidFill>
+                          <a:srgbClr val="000000"/>
+                        </a:solidFill>
+                        <a:effectLst/>
+                        <a:latin typeface="Calibri" panose="020F0502020204030204" pitchFamily="34" charset="0"/>
+                      </a:endParaRPr>
+                    </a:p>
+                  </a:txBody>
+                  <a:tcPr marL="9525" marR="9525" marT="9525" marB="0" anchor="b">
+                    <a:lnL w="12700" cap="flat" cmpd="sng" algn="ctr">
+                      <a:solidFill>
+                        <a:schemeClr val="tx1"/>
+                      </a:solidFill>
+                      <a:prstDash val="solid"/>
+                      <a:round/>
+                      <a:headEnd type="none" w="med" len="med"/>
+                      <a:tailEnd type="none" w="med" len="med"/>
+                    </a:lnL>
+                    <a:lnR w="12700" cap="flat" cmpd="sng" algn="ctr">
+                      <a:solidFill>
+                        <a:schemeClr val="tx1"/>
+                      </a:solidFill>
+                      <a:prstDash val="solid"/>
+                      <a:round/>
+                      <a:headEnd type="none" w="med" len="med"/>
+                      <a:tailEnd type="none" w="med" len="med"/>
+                    </a:lnR>
+                  </a:tcPr>
+                </a:tc>
+                <a:tc>
+                  <a:txBody>
+                    <a:bodyPr/>
+                    <a:lstStyle/>
+                    <a:p>
+                      <a:pPr algn="l" fontAlgn="b"/>
+                      <a:r>
+                        <a:rPr lang="tr-TR" sz="1600" u="none" strike="noStrike" dirty="0">
+                          <a:effectLst/>
+                        </a:rPr>
+                        <a:t>TP</a:t>
+                      </a:r>
+                      <a:endParaRPr lang="tr-TR" sz="1600" b="0" i="0" u="none" strike="noStrike" dirty="0">
+                        <a:solidFill>
+                          <a:srgbClr val="000000"/>
+                        </a:solidFill>
+                        <a:effectLst/>
+                        <a:latin typeface="Calibri" panose="020F0502020204030204" pitchFamily="34" charset="0"/>
+                      </a:endParaRPr>
+                    </a:p>
+                  </a:txBody>
+                  <a:tcPr marL="9525" marR="9525" marT="9525" marB="0" anchor="b">
+                    <a:lnL w="12700" cap="flat" cmpd="sng" algn="ctr">
+                      <a:solidFill>
+                        <a:schemeClr val="tx1"/>
+                      </a:solidFill>
+                      <a:prstDash val="solid"/>
+                      <a:round/>
+                      <a:headEnd type="none" w="med" len="med"/>
+                      <a:tailEnd type="none" w="med" len="med"/>
+                    </a:lnL>
+                    <a:lnR w="12700" cap="flat" cmpd="sng" algn="ctr">
+                      <a:solidFill>
+                        <a:schemeClr val="tx1"/>
+                      </a:solidFill>
+                      <a:prstDash val="solid"/>
+                      <a:round/>
+                      <a:headEnd type="none" w="med" len="med"/>
+                      <a:tailEnd type="none" w="med" len="med"/>
+                    </a:lnR>
+                    <a:lnT w="12700" cap="flat" cmpd="sng" algn="ctr">
+                      <a:solidFill>
+                        <a:schemeClr val="tx1"/>
+                      </a:solidFill>
+                      <a:prstDash val="solid"/>
+                      <a:round/>
+                      <a:headEnd type="none" w="med" len="med"/>
+                      <a:tailEnd type="none" w="med" len="med"/>
+                    </a:lnT>
+                    <a:lnB w="12700" cap="flat" cmpd="sng" algn="ctr">
+                      <a:solidFill>
+                        <a:schemeClr val="tx1"/>
+                      </a:solidFill>
+                      <a:prstDash val="solid"/>
+                      <a:round/>
+                      <a:headEnd type="none" w="med" len="med"/>
+                      <a:tailEnd type="none" w="med" len="med"/>
+                    </a:lnB>
+                  </a:tcPr>
+                </a:tc>
+                <a:tc>
+                  <a:txBody>
+                    <a:bodyPr/>
+                    <a:lstStyle/>
+                    <a:p>
+                      <a:pPr algn="r" fontAlgn="b"/>
+                      <a:r>
+                        <a:rPr lang="tr-TR" sz="1600" u="none" strike="noStrike" dirty="0">
+                          <a:effectLst/>
+                        </a:rPr>
+                        <a:t>7</a:t>
+                      </a:r>
+                      <a:endParaRPr lang="tr-TR" sz="1600" b="0" i="0" u="none" strike="noStrike" dirty="0">
+                        <a:solidFill>
+                          <a:srgbClr val="000000"/>
+                        </a:solidFill>
+                        <a:effectLst/>
+                        <a:latin typeface="Calibri" panose="020F0502020204030204" pitchFamily="34" charset="0"/>
+                      </a:endParaRPr>
+                    </a:p>
+                  </a:txBody>
+                  <a:tcPr marL="9525" marR="9525" marT="9525" marB="0" anchor="b">
+                    <a:lnL w="12700" cap="flat" cmpd="sng" algn="ctr">
+                      <a:solidFill>
+                        <a:schemeClr val="tx1"/>
+                      </a:solidFill>
+                      <a:prstDash val="solid"/>
+                      <a:round/>
+                      <a:headEnd type="none" w="med" len="med"/>
+                      <a:tailEnd type="none" w="med" len="med"/>
+                    </a:lnL>
+                    <a:lnR w="12700" cap="flat" cmpd="sng" algn="ctr">
+                      <a:solidFill>
+                        <a:schemeClr val="tx1"/>
+                      </a:solidFill>
+                      <a:prstDash val="solid"/>
+                      <a:round/>
+                      <a:headEnd type="none" w="med" len="med"/>
+                      <a:tailEnd type="none" w="med" len="med"/>
+                    </a:lnR>
+                    <a:lnT w="12700" cap="flat" cmpd="sng" algn="ctr">
+                      <a:solidFill>
+                        <a:schemeClr val="tx1"/>
+                      </a:solidFill>
+                      <a:prstDash val="solid"/>
+                      <a:round/>
+                      <a:headEnd type="none" w="med" len="med"/>
+                      <a:tailEnd type="none" w="med" len="med"/>
+                    </a:lnT>
+                    <a:lnB w="12700" cap="flat" cmpd="sng" algn="ctr">
+                      <a:solidFill>
+                        <a:schemeClr val="tx1"/>
+                      </a:solidFill>
+                      <a:prstDash val="solid"/>
+                      <a:round/>
+                      <a:headEnd type="none" w="med" len="med"/>
+                      <a:tailEnd type="none" w="med" len="med"/>
+                    </a:lnB>
+                  </a:tcPr>
+                </a:tc>
+                <a:extLst>
+                  <a:ext uri="{0D108BD9-81ED-4DB2-BD59-A6C34878D82A}">
+                    <a16:rowId xmlns:a16="http://schemas.microsoft.com/office/drawing/2014/main" val="2497433760"/>
+                  </a:ext>
+                </a:extLst>
+              </a:tr>
+              <a:tr h="267050">
+                <a:tc>
+                  <a:txBody>
+                    <a:bodyPr/>
+                    <a:lstStyle/>
+                    <a:p>
+                      <a:pPr algn="l" fontAlgn="b"/>
+                      <a:r>
+                        <a:rPr lang="tr-TR" sz="1600" u="none" strike="noStrike">
+                          <a:effectLst/>
+                        </a:rPr>
+                        <a:t>TN</a:t>
+                      </a:r>
+                      <a:endParaRPr lang="tr-TR" sz="1600" b="0" i="0" u="none" strike="noStrike">
+                        <a:solidFill>
+                          <a:srgbClr val="000000"/>
+                        </a:solidFill>
+                        <a:effectLst/>
+                        <a:latin typeface="Calibri" panose="020F0502020204030204" pitchFamily="34" charset="0"/>
+                      </a:endParaRPr>
+                    </a:p>
+                  </a:txBody>
+                  <a:tcPr marL="9525" marR="9525" marT="9525" marB="0" anchor="b">
+                    <a:lnL w="12700" cap="flat" cmpd="sng" algn="ctr">
+                      <a:solidFill>
+                        <a:schemeClr val="tx1"/>
+                      </a:solidFill>
+                      <a:prstDash val="solid"/>
+                      <a:round/>
+                      <a:headEnd type="none" w="med" len="med"/>
+                      <a:tailEnd type="none" w="med" len="med"/>
+                    </a:lnL>
+                    <a:lnR w="12700" cap="flat" cmpd="sng" algn="ctr">
+                      <a:solidFill>
+                        <a:schemeClr val="tx1"/>
+                      </a:solidFill>
+                      <a:prstDash val="solid"/>
+                      <a:round/>
+                      <a:headEnd type="none" w="med" len="med"/>
+                      <a:tailEnd type="none" w="med" len="med"/>
+                    </a:lnR>
+                    <a:lnT w="12700" cap="flat" cmpd="sng" algn="ctr">
+                      <a:solidFill>
+                        <a:schemeClr val="tx1"/>
+                      </a:solidFill>
+                      <a:prstDash val="solid"/>
+                      <a:round/>
+                      <a:headEnd type="none" w="med" len="med"/>
+                      <a:tailEnd type="none" w="med" len="med"/>
+                    </a:lnT>
+                    <a:lnB w="12700" cap="flat" cmpd="sng" algn="ctr">
+                      <a:solidFill>
+                        <a:schemeClr val="tx1"/>
+                      </a:solidFill>
+                      <a:prstDash val="solid"/>
+                      <a:round/>
+                      <a:headEnd type="none" w="med" len="med"/>
+                      <a:tailEnd type="none" w="med" len="med"/>
+                    </a:lnB>
+                  </a:tcPr>
+                </a:tc>
+                <a:tc>
+                  <a:txBody>
+                    <a:bodyPr/>
+                    <a:lstStyle/>
+                    <a:p>
+                      <a:pPr algn="r" fontAlgn="b"/>
+                      <a:r>
+                        <a:rPr lang="tr-TR" sz="1600" u="none" strike="noStrike">
+                          <a:effectLst/>
+                        </a:rPr>
+                        <a:t>8</a:t>
+                      </a:r>
+                      <a:endParaRPr lang="tr-TR" sz="1600" b="0" i="0" u="none" strike="noStrike">
+                        <a:solidFill>
+                          <a:srgbClr val="000000"/>
+                        </a:solidFill>
+                        <a:effectLst/>
+                        <a:latin typeface="Calibri" panose="020F0502020204030204" pitchFamily="34" charset="0"/>
+                      </a:endParaRPr>
+                    </a:p>
+                  </a:txBody>
+                  <a:tcPr marL="9525" marR="9525" marT="9525" marB="0" anchor="b">
+                    <a:lnL w="12700" cap="flat" cmpd="sng" algn="ctr">
+                      <a:solidFill>
+                        <a:schemeClr val="tx1"/>
+                      </a:solidFill>
+                      <a:prstDash val="solid"/>
+                      <a:round/>
+                      <a:headEnd type="none" w="med" len="med"/>
+                      <a:tailEnd type="none" w="med" len="med"/>
+                    </a:lnL>
+                    <a:lnR w="12700" cap="flat" cmpd="sng" algn="ctr">
+                      <a:solidFill>
+                        <a:schemeClr val="tx1"/>
+                      </a:solidFill>
+                      <a:prstDash val="solid"/>
+                      <a:round/>
+                      <a:headEnd type="none" w="med" len="med"/>
+                      <a:tailEnd type="none" w="med" len="med"/>
+                    </a:lnR>
+                    <a:lnT w="12700" cap="flat" cmpd="sng" algn="ctr">
+                      <a:solidFill>
+                        <a:schemeClr val="tx1"/>
+                      </a:solidFill>
+                      <a:prstDash val="solid"/>
+                      <a:round/>
+                      <a:headEnd type="none" w="med" len="med"/>
+                      <a:tailEnd type="none" w="med" len="med"/>
+                    </a:lnT>
+                    <a:lnB w="12700" cap="flat" cmpd="sng" algn="ctr">
+                      <a:solidFill>
+                        <a:schemeClr val="tx1"/>
+                      </a:solidFill>
+                      <a:prstDash val="solid"/>
+                      <a:round/>
+                      <a:headEnd type="none" w="med" len="med"/>
+                      <a:tailEnd type="none" w="med" len="med"/>
+                    </a:lnB>
+                  </a:tcPr>
+                </a:tc>
+                <a:tc>
+                  <a:txBody>
+                    <a:bodyPr/>
+                    <a:lstStyle/>
+                    <a:p>
+                      <a:pPr algn="l" fontAlgn="b"/>
+                      <a:endParaRPr lang="tr-TR" sz="1600" b="0" i="0" u="none" strike="noStrike">
+                        <a:solidFill>
+                          <a:srgbClr val="000000"/>
+                        </a:solidFill>
+                        <a:effectLst/>
+                        <a:latin typeface="Calibri" panose="020F0502020204030204" pitchFamily="34" charset="0"/>
+                      </a:endParaRPr>
+                    </a:p>
+                  </a:txBody>
+                  <a:tcPr marL="9525" marR="9525" marT="9525" marB="0" anchor="b">
+                    <a:lnL w="12700" cap="flat" cmpd="sng" algn="ctr">
+                      <a:solidFill>
+                        <a:schemeClr val="tx1"/>
+                      </a:solidFill>
+                      <a:prstDash val="solid"/>
+                      <a:round/>
+                      <a:headEnd type="none" w="med" len="med"/>
+                      <a:tailEnd type="none" w="med" len="med"/>
+                    </a:lnL>
+                    <a:lnR w="12700" cap="flat" cmpd="sng" algn="ctr">
+                      <a:solidFill>
+                        <a:schemeClr val="tx1"/>
+                      </a:solidFill>
+                      <a:prstDash val="solid"/>
+                      <a:round/>
+                      <a:headEnd type="none" w="med" len="med"/>
+                      <a:tailEnd type="none" w="med" len="med"/>
+                    </a:lnR>
+                  </a:tcPr>
+                </a:tc>
+                <a:tc>
+                  <a:txBody>
+                    <a:bodyPr/>
+                    <a:lstStyle/>
+                    <a:p>
+                      <a:pPr algn="l" fontAlgn="b"/>
+                      <a:r>
+                        <a:rPr lang="tr-TR" sz="1600" u="none" strike="noStrike" dirty="0">
+                          <a:effectLst/>
+                        </a:rPr>
+                        <a:t>TN</a:t>
+                      </a:r>
+                      <a:endParaRPr lang="tr-TR" sz="1600" b="0" i="0" u="none" strike="noStrike" dirty="0">
+                        <a:solidFill>
+                          <a:srgbClr val="000000"/>
+                        </a:solidFill>
+                        <a:effectLst/>
+                        <a:latin typeface="Calibri" panose="020F0502020204030204" pitchFamily="34" charset="0"/>
+                      </a:endParaRPr>
+                    </a:p>
+                  </a:txBody>
+                  <a:tcPr marL="9525" marR="9525" marT="9525" marB="0" anchor="b">
+                    <a:lnL w="12700" cap="flat" cmpd="sng" algn="ctr">
+                      <a:solidFill>
+                        <a:schemeClr val="tx1"/>
+                      </a:solidFill>
+                      <a:prstDash val="solid"/>
+                      <a:round/>
+                      <a:headEnd type="none" w="med" len="med"/>
+                      <a:tailEnd type="none" w="med" len="med"/>
+                    </a:lnL>
+                    <a:lnR w="12700" cap="flat" cmpd="sng" algn="ctr">
+                      <a:solidFill>
+                        <a:schemeClr val="tx1"/>
+                      </a:solidFill>
+                      <a:prstDash val="solid"/>
+                      <a:round/>
+                      <a:headEnd type="none" w="med" len="med"/>
+                      <a:tailEnd type="none" w="med" len="med"/>
+                    </a:lnR>
+                    <a:lnT w="12700" cap="flat" cmpd="sng" algn="ctr">
+                      <a:solidFill>
+                        <a:schemeClr val="tx1"/>
+                      </a:solidFill>
+                      <a:prstDash val="solid"/>
+                      <a:round/>
+                      <a:headEnd type="none" w="med" len="med"/>
+                      <a:tailEnd type="none" w="med" len="med"/>
+                    </a:lnT>
+                    <a:lnB w="12700" cap="flat" cmpd="sng" algn="ctr">
+                      <a:solidFill>
+                        <a:schemeClr val="tx1"/>
+                      </a:solidFill>
+                      <a:prstDash val="solid"/>
+                      <a:round/>
+                      <a:headEnd type="none" w="med" len="med"/>
+                      <a:tailEnd type="none" w="med" len="med"/>
+                    </a:lnB>
+                  </a:tcPr>
+                </a:tc>
+                <a:tc>
+                  <a:txBody>
+                    <a:bodyPr/>
+                    <a:lstStyle/>
+                    <a:p>
+                      <a:pPr algn="r" fontAlgn="b"/>
+                      <a:r>
+                        <a:rPr lang="tr-TR" sz="1600" u="none" strike="noStrike">
+                          <a:effectLst/>
+                        </a:rPr>
+                        <a:t>2</a:t>
+                      </a:r>
+                      <a:endParaRPr lang="tr-TR" sz="1600" b="0" i="0" u="none" strike="noStrike">
+                        <a:solidFill>
+                          <a:srgbClr val="000000"/>
+                        </a:solidFill>
+                        <a:effectLst/>
+                        <a:latin typeface="Calibri" panose="020F0502020204030204" pitchFamily="34" charset="0"/>
+                      </a:endParaRPr>
+                    </a:p>
+                  </a:txBody>
+                  <a:tcPr marL="9525" marR="9525" marT="9525" marB="0" anchor="b">
+                    <a:lnL w="12700" cap="flat" cmpd="sng" algn="ctr">
+                      <a:solidFill>
+                        <a:schemeClr val="tx1"/>
+                      </a:solidFill>
+                      <a:prstDash val="solid"/>
+                      <a:round/>
+                      <a:headEnd type="none" w="med" len="med"/>
+                      <a:tailEnd type="none" w="med" len="med"/>
+                    </a:lnL>
+                    <a:lnR w="12700" cap="flat" cmpd="sng" algn="ctr">
+                      <a:solidFill>
+                        <a:schemeClr val="tx1"/>
+                      </a:solidFill>
+                      <a:prstDash val="solid"/>
+                      <a:round/>
+                      <a:headEnd type="none" w="med" len="med"/>
+                      <a:tailEnd type="none" w="med" len="med"/>
+                    </a:lnR>
+                    <a:lnT w="12700" cap="flat" cmpd="sng" algn="ctr">
+                      <a:solidFill>
+                        <a:schemeClr val="tx1"/>
+                      </a:solidFill>
+                      <a:prstDash val="solid"/>
+                      <a:round/>
+                      <a:headEnd type="none" w="med" len="med"/>
+                      <a:tailEnd type="none" w="med" len="med"/>
+                    </a:lnT>
+                    <a:lnB w="12700" cap="flat" cmpd="sng" algn="ctr">
+                      <a:solidFill>
+                        <a:schemeClr val="tx1"/>
+                      </a:solidFill>
+                      <a:prstDash val="solid"/>
+                      <a:round/>
+                      <a:headEnd type="none" w="med" len="med"/>
+                      <a:tailEnd type="none" w="med" len="med"/>
+                    </a:lnB>
+                  </a:tcPr>
+                </a:tc>
+                <a:tc>
+                  <a:txBody>
+                    <a:bodyPr/>
+                    <a:lstStyle/>
+                    <a:p>
+                      <a:pPr algn="l" fontAlgn="b"/>
+                      <a:endParaRPr lang="tr-TR" sz="1600" b="0" i="0" u="none" strike="noStrike">
+                        <a:solidFill>
+                          <a:srgbClr val="000000"/>
+                        </a:solidFill>
+                        <a:effectLst/>
+                        <a:latin typeface="Calibri" panose="020F0502020204030204" pitchFamily="34" charset="0"/>
+                      </a:endParaRPr>
+                    </a:p>
+                  </a:txBody>
+                  <a:tcPr marL="9525" marR="9525" marT="9525" marB="0" anchor="b">
+                    <a:lnL w="12700" cap="flat" cmpd="sng" algn="ctr">
+                      <a:solidFill>
+                        <a:schemeClr val="tx1"/>
+                      </a:solidFill>
+                      <a:prstDash val="solid"/>
+                      <a:round/>
+                      <a:headEnd type="none" w="med" len="med"/>
+                      <a:tailEnd type="none" w="med" len="med"/>
+                    </a:lnL>
+                    <a:lnR w="12700" cap="flat" cmpd="sng" algn="ctr">
+                      <a:solidFill>
+                        <a:schemeClr val="tx1"/>
+                      </a:solidFill>
+                      <a:prstDash val="solid"/>
+                      <a:round/>
+                      <a:headEnd type="none" w="med" len="med"/>
+                      <a:tailEnd type="none" w="med" len="med"/>
+                    </a:lnR>
+                  </a:tcPr>
+                </a:tc>
+                <a:tc>
+                  <a:txBody>
+                    <a:bodyPr/>
+                    <a:lstStyle/>
+                    <a:p>
+                      <a:pPr algn="l" fontAlgn="b"/>
+                      <a:r>
+                        <a:rPr lang="tr-TR" sz="1600" u="none" strike="noStrike" dirty="0">
+                          <a:effectLst/>
+                        </a:rPr>
+                        <a:t>TN</a:t>
+                      </a:r>
+                      <a:endParaRPr lang="tr-TR" sz="1600" b="0" i="0" u="none" strike="noStrike" dirty="0">
+                        <a:solidFill>
+                          <a:srgbClr val="000000"/>
+                        </a:solidFill>
+                        <a:effectLst/>
+                        <a:latin typeface="Calibri" panose="020F0502020204030204" pitchFamily="34" charset="0"/>
+                      </a:endParaRPr>
+                    </a:p>
+                  </a:txBody>
+                  <a:tcPr marL="9525" marR="9525" marT="9525" marB="0" anchor="b">
+                    <a:lnL w="12700" cap="flat" cmpd="sng" algn="ctr">
+                      <a:solidFill>
+                        <a:schemeClr val="tx1"/>
+                      </a:solidFill>
+                      <a:prstDash val="solid"/>
+                      <a:round/>
+                      <a:headEnd type="none" w="med" len="med"/>
+                      <a:tailEnd type="none" w="med" len="med"/>
+                    </a:lnL>
+                    <a:lnR w="12700" cap="flat" cmpd="sng" algn="ctr">
+                      <a:solidFill>
+                        <a:schemeClr val="tx1"/>
+                      </a:solidFill>
+                      <a:prstDash val="solid"/>
+                      <a:round/>
+                      <a:headEnd type="none" w="med" len="med"/>
+                      <a:tailEnd type="none" w="med" len="med"/>
+                    </a:lnR>
+                    <a:lnT w="12700" cap="flat" cmpd="sng" algn="ctr">
+                      <a:solidFill>
+                        <a:schemeClr val="tx1"/>
+                      </a:solidFill>
+                      <a:prstDash val="solid"/>
+                      <a:round/>
+                      <a:headEnd type="none" w="med" len="med"/>
+                      <a:tailEnd type="none" w="med" len="med"/>
+                    </a:lnT>
+                    <a:lnB w="12700" cap="flat" cmpd="sng" algn="ctr">
+                      <a:solidFill>
+                        <a:schemeClr val="tx1"/>
+                      </a:solidFill>
+                      <a:prstDash val="solid"/>
+                      <a:round/>
+                      <a:headEnd type="none" w="med" len="med"/>
+                      <a:tailEnd type="none" w="med" len="med"/>
+                    </a:lnB>
+                  </a:tcPr>
+                </a:tc>
+                <a:tc>
+                  <a:txBody>
+                    <a:bodyPr/>
+                    <a:lstStyle/>
+                    <a:p>
+                      <a:pPr algn="r" fontAlgn="b"/>
+                      <a:r>
+                        <a:rPr lang="tr-TR" sz="1600" u="none" strike="noStrike">
+                          <a:effectLst/>
+                        </a:rPr>
+                        <a:t>10</a:t>
+                      </a:r>
+                      <a:endParaRPr lang="tr-TR" sz="1600" b="0" i="0" u="none" strike="noStrike">
+                        <a:solidFill>
+                          <a:srgbClr val="000000"/>
+                        </a:solidFill>
+                        <a:effectLst/>
+                        <a:latin typeface="Calibri" panose="020F0502020204030204" pitchFamily="34" charset="0"/>
+                      </a:endParaRPr>
+                    </a:p>
+                  </a:txBody>
+                  <a:tcPr marL="9525" marR="9525" marT="9525" marB="0" anchor="b">
+                    <a:lnL w="12700" cap="flat" cmpd="sng" algn="ctr">
+                      <a:solidFill>
+                        <a:schemeClr val="tx1"/>
+                      </a:solidFill>
+                      <a:prstDash val="solid"/>
+                      <a:round/>
+                      <a:headEnd type="none" w="med" len="med"/>
+                      <a:tailEnd type="none" w="med" len="med"/>
+                    </a:lnL>
+                    <a:lnR w="12700" cap="flat" cmpd="sng" algn="ctr">
+                      <a:solidFill>
+                        <a:schemeClr val="tx1"/>
+                      </a:solidFill>
+                      <a:prstDash val="solid"/>
+                      <a:round/>
+                      <a:headEnd type="none" w="med" len="med"/>
+                      <a:tailEnd type="none" w="med" len="med"/>
+                    </a:lnR>
+                    <a:lnT w="12700" cap="flat" cmpd="sng" algn="ctr">
+                      <a:solidFill>
+                        <a:schemeClr val="tx1"/>
+                      </a:solidFill>
+                      <a:prstDash val="solid"/>
+                      <a:round/>
+                      <a:headEnd type="none" w="med" len="med"/>
+                      <a:tailEnd type="none" w="med" len="med"/>
+                    </a:lnT>
+                    <a:lnB w="12700" cap="flat" cmpd="sng" algn="ctr">
+                      <a:solidFill>
+                        <a:schemeClr val="tx1"/>
+                      </a:solidFill>
+                      <a:prstDash val="solid"/>
+                      <a:round/>
+                      <a:headEnd type="none" w="med" len="med"/>
+                      <a:tailEnd type="none" w="med" len="med"/>
+                    </a:lnB>
+                  </a:tcPr>
+                </a:tc>
+                <a:extLst>
+                  <a:ext uri="{0D108BD9-81ED-4DB2-BD59-A6C34878D82A}">
+                    <a16:rowId xmlns:a16="http://schemas.microsoft.com/office/drawing/2014/main" val="4032008820"/>
+                  </a:ext>
+                </a:extLst>
+              </a:tr>
+              <a:tr h="267050">
+                <a:tc>
+                  <a:txBody>
+                    <a:bodyPr/>
+                    <a:lstStyle/>
+                    <a:p>
+                      <a:pPr algn="l" fontAlgn="b"/>
+                      <a:r>
+                        <a:rPr lang="tr-TR" sz="1600" u="none" strike="noStrike" dirty="0">
+                          <a:effectLst/>
+                        </a:rPr>
+                        <a:t>FP</a:t>
+                      </a:r>
+                      <a:endParaRPr lang="tr-TR" sz="1600" b="0" i="0" u="none" strike="noStrike" dirty="0">
+                        <a:solidFill>
+                          <a:srgbClr val="000000"/>
+                        </a:solidFill>
+                        <a:effectLst/>
+                        <a:latin typeface="Calibri" panose="020F0502020204030204" pitchFamily="34" charset="0"/>
+                      </a:endParaRPr>
+                    </a:p>
+                  </a:txBody>
+                  <a:tcPr marL="9525" marR="9525" marT="9525" marB="0" anchor="b">
+                    <a:lnL w="12700" cap="flat" cmpd="sng" algn="ctr">
+                      <a:solidFill>
+                        <a:schemeClr val="tx1"/>
+                      </a:solidFill>
+                      <a:prstDash val="solid"/>
+                      <a:round/>
+                      <a:headEnd type="none" w="med" len="med"/>
+                      <a:tailEnd type="none" w="med" len="med"/>
+                    </a:lnL>
+                    <a:lnR w="12700" cap="flat" cmpd="sng" algn="ctr">
+                      <a:solidFill>
+                        <a:schemeClr val="tx1"/>
+                      </a:solidFill>
+                      <a:prstDash val="solid"/>
+                      <a:round/>
+                      <a:headEnd type="none" w="med" len="med"/>
+                      <a:tailEnd type="none" w="med" len="med"/>
+                    </a:lnR>
+                    <a:lnT w="12700" cap="flat" cmpd="sng" algn="ctr">
+                      <a:solidFill>
+                        <a:schemeClr val="tx1"/>
+                      </a:solidFill>
+                      <a:prstDash val="solid"/>
+                      <a:round/>
+                      <a:headEnd type="none" w="med" len="med"/>
+                      <a:tailEnd type="none" w="med" len="med"/>
+                    </a:lnT>
+                    <a:lnB w="12700" cap="flat" cmpd="sng" algn="ctr">
+                      <a:solidFill>
+                        <a:schemeClr val="tx1"/>
+                      </a:solidFill>
+                      <a:prstDash val="solid"/>
+                      <a:round/>
+                      <a:headEnd type="none" w="med" len="med"/>
+                      <a:tailEnd type="none" w="med" len="med"/>
+                    </a:lnB>
+                  </a:tcPr>
+                </a:tc>
+                <a:tc>
+                  <a:txBody>
+                    <a:bodyPr/>
+                    <a:lstStyle/>
+                    <a:p>
+                      <a:pPr algn="r" fontAlgn="b"/>
+                      <a:r>
+                        <a:rPr lang="tr-TR" sz="1600" u="none" strike="noStrike">
+                          <a:effectLst/>
+                        </a:rPr>
+                        <a:t>2</a:t>
+                      </a:r>
+                      <a:endParaRPr lang="tr-TR" sz="1600" b="0" i="0" u="none" strike="noStrike">
+                        <a:solidFill>
+                          <a:srgbClr val="000000"/>
+                        </a:solidFill>
+                        <a:effectLst/>
+                        <a:latin typeface="Calibri" panose="020F0502020204030204" pitchFamily="34" charset="0"/>
+                      </a:endParaRPr>
+                    </a:p>
+                  </a:txBody>
+                  <a:tcPr marL="9525" marR="9525" marT="9525" marB="0" anchor="b">
+                    <a:lnL w="12700" cap="flat" cmpd="sng" algn="ctr">
+                      <a:solidFill>
+                        <a:schemeClr val="tx1"/>
+                      </a:solidFill>
+                      <a:prstDash val="solid"/>
+                      <a:round/>
+                      <a:headEnd type="none" w="med" len="med"/>
+                      <a:tailEnd type="none" w="med" len="med"/>
+                    </a:lnL>
+                    <a:lnR w="12700" cap="flat" cmpd="sng" algn="ctr">
+                      <a:solidFill>
+                        <a:schemeClr val="tx1"/>
+                      </a:solidFill>
+                      <a:prstDash val="solid"/>
+                      <a:round/>
+                      <a:headEnd type="none" w="med" len="med"/>
+                      <a:tailEnd type="none" w="med" len="med"/>
+                    </a:lnR>
+                    <a:lnT w="12700" cap="flat" cmpd="sng" algn="ctr">
+                      <a:solidFill>
+                        <a:schemeClr val="tx1"/>
+                      </a:solidFill>
+                      <a:prstDash val="solid"/>
+                      <a:round/>
+                      <a:headEnd type="none" w="med" len="med"/>
+                      <a:tailEnd type="none" w="med" len="med"/>
+                    </a:lnT>
+                    <a:lnB w="12700" cap="flat" cmpd="sng" algn="ctr">
+                      <a:solidFill>
+                        <a:schemeClr val="tx1"/>
+                      </a:solidFill>
+                      <a:prstDash val="solid"/>
+                      <a:round/>
+                      <a:headEnd type="none" w="med" len="med"/>
+                      <a:tailEnd type="none" w="med" len="med"/>
+                    </a:lnB>
+                  </a:tcPr>
+                </a:tc>
+                <a:tc>
+                  <a:txBody>
+                    <a:bodyPr/>
+                    <a:lstStyle/>
+                    <a:p>
+                      <a:pPr algn="l" fontAlgn="b"/>
+                      <a:endParaRPr lang="tr-TR" sz="1600" b="0" i="0" u="none" strike="noStrike">
+                        <a:solidFill>
+                          <a:srgbClr val="000000"/>
+                        </a:solidFill>
+                        <a:effectLst/>
+                        <a:latin typeface="Calibri" panose="020F0502020204030204" pitchFamily="34" charset="0"/>
+                      </a:endParaRPr>
+                    </a:p>
+                  </a:txBody>
+                  <a:tcPr marL="9525" marR="9525" marT="9525" marB="0" anchor="b">
+                    <a:lnL w="12700" cap="flat" cmpd="sng" algn="ctr">
+                      <a:solidFill>
+                        <a:schemeClr val="tx1"/>
+                      </a:solidFill>
+                      <a:prstDash val="solid"/>
+                      <a:round/>
+                      <a:headEnd type="none" w="med" len="med"/>
+                      <a:tailEnd type="none" w="med" len="med"/>
+                    </a:lnL>
+                    <a:lnR w="12700" cap="flat" cmpd="sng" algn="ctr">
+                      <a:solidFill>
+                        <a:schemeClr val="tx1"/>
+                      </a:solidFill>
+                      <a:prstDash val="solid"/>
+                      <a:round/>
+                      <a:headEnd type="none" w="med" len="med"/>
+                      <a:tailEnd type="none" w="med" len="med"/>
+                    </a:lnR>
+                  </a:tcPr>
+                </a:tc>
+                <a:tc>
+                  <a:txBody>
+                    <a:bodyPr/>
+                    <a:lstStyle/>
+                    <a:p>
+                      <a:pPr algn="l" fontAlgn="b"/>
+                      <a:r>
+                        <a:rPr lang="tr-TR" sz="1600" u="none" strike="noStrike" dirty="0">
+                          <a:effectLst/>
+                        </a:rPr>
+                        <a:t>FP</a:t>
+                      </a:r>
+                      <a:endParaRPr lang="tr-TR" sz="1600" b="0" i="0" u="none" strike="noStrike" dirty="0">
+                        <a:solidFill>
+                          <a:srgbClr val="000000"/>
+                        </a:solidFill>
+                        <a:effectLst/>
+                        <a:latin typeface="Calibri" panose="020F0502020204030204" pitchFamily="34" charset="0"/>
+                      </a:endParaRPr>
+                    </a:p>
+                  </a:txBody>
+                  <a:tcPr marL="9525" marR="9525" marT="9525" marB="0" anchor="b">
+                    <a:lnL w="12700" cap="flat" cmpd="sng" algn="ctr">
+                      <a:solidFill>
+                        <a:schemeClr val="tx1"/>
+                      </a:solidFill>
+                      <a:prstDash val="solid"/>
+                      <a:round/>
+                      <a:headEnd type="none" w="med" len="med"/>
+                      <a:tailEnd type="none" w="med" len="med"/>
+                    </a:lnL>
+                    <a:lnR w="12700" cap="flat" cmpd="sng" algn="ctr">
+                      <a:solidFill>
+                        <a:schemeClr val="tx1"/>
+                      </a:solidFill>
+                      <a:prstDash val="solid"/>
+                      <a:round/>
+                      <a:headEnd type="none" w="med" len="med"/>
+                      <a:tailEnd type="none" w="med" len="med"/>
+                    </a:lnR>
+                    <a:lnT w="12700" cap="flat" cmpd="sng" algn="ctr">
+                      <a:solidFill>
+                        <a:schemeClr val="tx1"/>
+                      </a:solidFill>
+                      <a:prstDash val="solid"/>
+                      <a:round/>
+                      <a:headEnd type="none" w="med" len="med"/>
+                      <a:tailEnd type="none" w="med" len="med"/>
+                    </a:lnT>
+                    <a:lnB w="12700" cap="flat" cmpd="sng" algn="ctr">
+                      <a:solidFill>
+                        <a:schemeClr val="tx1"/>
+                      </a:solidFill>
+                      <a:prstDash val="solid"/>
+                      <a:round/>
+                      <a:headEnd type="none" w="med" len="med"/>
+                      <a:tailEnd type="none" w="med" len="med"/>
+                    </a:lnB>
+                  </a:tcPr>
+                </a:tc>
+                <a:tc>
+                  <a:txBody>
+                    <a:bodyPr/>
+                    <a:lstStyle/>
+                    <a:p>
+                      <a:pPr algn="r" fontAlgn="b"/>
+                      <a:r>
+                        <a:rPr lang="tr-TR" sz="1600" u="none" strike="noStrike">
+                          <a:effectLst/>
+                        </a:rPr>
+                        <a:t>8</a:t>
+                      </a:r>
+                      <a:endParaRPr lang="tr-TR" sz="1600" b="0" i="0" u="none" strike="noStrike">
+                        <a:solidFill>
+                          <a:srgbClr val="000000"/>
+                        </a:solidFill>
+                        <a:effectLst/>
+                        <a:latin typeface="Calibri" panose="020F0502020204030204" pitchFamily="34" charset="0"/>
+                      </a:endParaRPr>
+                    </a:p>
+                  </a:txBody>
+                  <a:tcPr marL="9525" marR="9525" marT="9525" marB="0" anchor="b">
+                    <a:lnL w="12700" cap="flat" cmpd="sng" algn="ctr">
+                      <a:solidFill>
+                        <a:schemeClr val="tx1"/>
+                      </a:solidFill>
+                      <a:prstDash val="solid"/>
+                      <a:round/>
+                      <a:headEnd type="none" w="med" len="med"/>
+                      <a:tailEnd type="none" w="med" len="med"/>
+                    </a:lnL>
+                    <a:lnR w="12700" cap="flat" cmpd="sng" algn="ctr">
+                      <a:solidFill>
+                        <a:schemeClr val="tx1"/>
+                      </a:solidFill>
+                      <a:prstDash val="solid"/>
+                      <a:round/>
+                      <a:headEnd type="none" w="med" len="med"/>
+                      <a:tailEnd type="none" w="med" len="med"/>
+                    </a:lnR>
+                    <a:lnT w="12700" cap="flat" cmpd="sng" algn="ctr">
+                      <a:solidFill>
+                        <a:schemeClr val="tx1"/>
+                      </a:solidFill>
+                      <a:prstDash val="solid"/>
+                      <a:round/>
+                      <a:headEnd type="none" w="med" len="med"/>
+                      <a:tailEnd type="none" w="med" len="med"/>
+                    </a:lnT>
+                    <a:lnB w="12700" cap="flat" cmpd="sng" algn="ctr">
+                      <a:solidFill>
+                        <a:schemeClr val="tx1"/>
+                      </a:solidFill>
+                      <a:prstDash val="solid"/>
+                      <a:round/>
+                      <a:headEnd type="none" w="med" len="med"/>
+                      <a:tailEnd type="none" w="med" len="med"/>
+                    </a:lnB>
+                  </a:tcPr>
+                </a:tc>
+                <a:tc>
+                  <a:txBody>
+                    <a:bodyPr/>
+                    <a:lstStyle/>
+                    <a:p>
+                      <a:pPr algn="l" fontAlgn="b"/>
+                      <a:endParaRPr lang="tr-TR" sz="1600" b="0" i="0" u="none" strike="noStrike">
+                        <a:solidFill>
+                          <a:srgbClr val="000000"/>
+                        </a:solidFill>
+                        <a:effectLst/>
+                        <a:latin typeface="Calibri" panose="020F0502020204030204" pitchFamily="34" charset="0"/>
+                      </a:endParaRPr>
+                    </a:p>
+                  </a:txBody>
+                  <a:tcPr marL="9525" marR="9525" marT="9525" marB="0" anchor="b">
+                    <a:lnL w="12700" cap="flat" cmpd="sng" algn="ctr">
+                      <a:solidFill>
+                        <a:schemeClr val="tx1"/>
+                      </a:solidFill>
+                      <a:prstDash val="solid"/>
+                      <a:round/>
+                      <a:headEnd type="none" w="med" len="med"/>
+                      <a:tailEnd type="none" w="med" len="med"/>
+                    </a:lnL>
+                    <a:lnR w="12700" cap="flat" cmpd="sng" algn="ctr">
+                      <a:solidFill>
+                        <a:schemeClr val="tx1"/>
+                      </a:solidFill>
+                      <a:prstDash val="solid"/>
+                      <a:round/>
+                      <a:headEnd type="none" w="med" len="med"/>
+                      <a:tailEnd type="none" w="med" len="med"/>
+                    </a:lnR>
+                  </a:tcPr>
+                </a:tc>
+                <a:tc>
+                  <a:txBody>
+                    <a:bodyPr/>
+                    <a:lstStyle/>
+                    <a:p>
+                      <a:pPr algn="l" fontAlgn="b"/>
+                      <a:r>
+                        <a:rPr lang="tr-TR" sz="1600" u="none" strike="noStrike" dirty="0">
+                          <a:effectLst/>
+                        </a:rPr>
+                        <a:t>FP</a:t>
+                      </a:r>
+                      <a:endParaRPr lang="tr-TR" sz="1600" b="0" i="0" u="none" strike="noStrike" dirty="0">
+                        <a:solidFill>
+                          <a:srgbClr val="000000"/>
+                        </a:solidFill>
+                        <a:effectLst/>
+                        <a:latin typeface="Calibri" panose="020F0502020204030204" pitchFamily="34" charset="0"/>
+                      </a:endParaRPr>
+                    </a:p>
+                  </a:txBody>
+                  <a:tcPr marL="9525" marR="9525" marT="9525" marB="0" anchor="b">
+                    <a:lnL w="12700" cap="flat" cmpd="sng" algn="ctr">
+                      <a:solidFill>
+                        <a:schemeClr val="tx1"/>
+                      </a:solidFill>
+                      <a:prstDash val="solid"/>
+                      <a:round/>
+                      <a:headEnd type="none" w="med" len="med"/>
+                      <a:tailEnd type="none" w="med" len="med"/>
+                    </a:lnL>
+                    <a:lnR w="12700" cap="flat" cmpd="sng" algn="ctr">
+                      <a:solidFill>
+                        <a:schemeClr val="tx1"/>
+                      </a:solidFill>
+                      <a:prstDash val="solid"/>
+                      <a:round/>
+                      <a:headEnd type="none" w="med" len="med"/>
+                      <a:tailEnd type="none" w="med" len="med"/>
+                    </a:lnR>
+                    <a:lnT w="12700" cap="flat" cmpd="sng" algn="ctr">
+                      <a:solidFill>
+                        <a:schemeClr val="tx1"/>
+                      </a:solidFill>
+                      <a:prstDash val="solid"/>
+                      <a:round/>
+                      <a:headEnd type="none" w="med" len="med"/>
+                      <a:tailEnd type="none" w="med" len="med"/>
+                    </a:lnT>
+                    <a:lnB w="12700" cap="flat" cmpd="sng" algn="ctr">
+                      <a:solidFill>
+                        <a:schemeClr val="tx1"/>
+                      </a:solidFill>
+                      <a:prstDash val="solid"/>
+                      <a:round/>
+                      <a:headEnd type="none" w="med" len="med"/>
+                      <a:tailEnd type="none" w="med" len="med"/>
+                    </a:lnB>
+                    <a:solidFill>
+                      <a:schemeClr val="accent4">
+                        <a:lumMod val="20000"/>
+                        <a:lumOff val="80000"/>
+                      </a:schemeClr>
+                    </a:solidFill>
+                  </a:tcPr>
+                </a:tc>
+                <a:tc>
+                  <a:txBody>
+                    <a:bodyPr/>
+                    <a:lstStyle/>
+                    <a:p>
+                      <a:pPr algn="r" fontAlgn="b"/>
+                      <a:r>
+                        <a:rPr lang="tr-TR" sz="1600" u="none" strike="noStrike" dirty="0">
+                          <a:effectLst/>
+                        </a:rPr>
+                        <a:t>0</a:t>
+                      </a:r>
+                      <a:endParaRPr lang="tr-TR" sz="1600" b="0" i="0" u="none" strike="noStrike" dirty="0">
+                        <a:solidFill>
+                          <a:srgbClr val="000000"/>
+                        </a:solidFill>
+                        <a:effectLst/>
+                        <a:latin typeface="Calibri" panose="020F0502020204030204" pitchFamily="34" charset="0"/>
+                      </a:endParaRPr>
+                    </a:p>
+                  </a:txBody>
+                  <a:tcPr marL="9525" marR="9525" marT="9525" marB="0" anchor="b">
+                    <a:lnL w="12700" cap="flat" cmpd="sng" algn="ctr">
+                      <a:solidFill>
+                        <a:schemeClr val="tx1"/>
+                      </a:solidFill>
+                      <a:prstDash val="solid"/>
+                      <a:round/>
+                      <a:headEnd type="none" w="med" len="med"/>
+                      <a:tailEnd type="none" w="med" len="med"/>
+                    </a:lnL>
+                    <a:lnR w="12700" cap="flat" cmpd="sng" algn="ctr">
+                      <a:solidFill>
+                        <a:schemeClr val="tx1"/>
+                      </a:solidFill>
+                      <a:prstDash val="solid"/>
+                      <a:round/>
+                      <a:headEnd type="none" w="med" len="med"/>
+                      <a:tailEnd type="none" w="med" len="med"/>
+                    </a:lnR>
+                    <a:lnT w="12700" cap="flat" cmpd="sng" algn="ctr">
+                      <a:solidFill>
+                        <a:schemeClr val="tx1"/>
+                      </a:solidFill>
+                      <a:prstDash val="solid"/>
+                      <a:round/>
+                      <a:headEnd type="none" w="med" len="med"/>
+                      <a:tailEnd type="none" w="med" len="med"/>
+                    </a:lnT>
+                    <a:lnB w="12700" cap="flat" cmpd="sng" algn="ctr">
+                      <a:solidFill>
+                        <a:schemeClr val="tx1"/>
+                      </a:solidFill>
+                      <a:prstDash val="solid"/>
+                      <a:round/>
+                      <a:headEnd type="none" w="med" len="med"/>
+                      <a:tailEnd type="none" w="med" len="med"/>
+                    </a:lnB>
+                    <a:solidFill>
+                      <a:schemeClr val="accent4">
+                        <a:lumMod val="20000"/>
+                        <a:lumOff val="80000"/>
+                      </a:schemeClr>
+                    </a:solidFill>
+                  </a:tcPr>
+                </a:tc>
+                <a:extLst>
+                  <a:ext uri="{0D108BD9-81ED-4DB2-BD59-A6C34878D82A}">
+                    <a16:rowId xmlns:a16="http://schemas.microsoft.com/office/drawing/2014/main" val="3730851239"/>
+                  </a:ext>
+                </a:extLst>
+              </a:tr>
+              <a:tr h="267050">
+                <a:tc>
+                  <a:txBody>
+                    <a:bodyPr/>
+                    <a:lstStyle/>
+                    <a:p>
+                      <a:pPr algn="l" fontAlgn="b"/>
+                      <a:r>
+                        <a:rPr lang="tr-TR" sz="1600" u="none" strike="noStrike">
+                          <a:effectLst/>
+                        </a:rPr>
+                        <a:t>FN</a:t>
+                      </a:r>
+                      <a:endParaRPr lang="tr-TR" sz="1600" b="0" i="0" u="none" strike="noStrike">
+                        <a:solidFill>
+                          <a:srgbClr val="000000"/>
+                        </a:solidFill>
+                        <a:effectLst/>
+                        <a:latin typeface="Calibri" panose="020F0502020204030204" pitchFamily="34" charset="0"/>
+                      </a:endParaRPr>
+                    </a:p>
+                  </a:txBody>
+                  <a:tcPr marL="9525" marR="9525" marT="9525" marB="0" anchor="b">
+                    <a:lnL w="12700" cap="flat" cmpd="sng" algn="ctr">
+                      <a:solidFill>
+                        <a:schemeClr val="tx1"/>
+                      </a:solidFill>
+                      <a:prstDash val="solid"/>
+                      <a:round/>
+                      <a:headEnd type="none" w="med" len="med"/>
+                      <a:tailEnd type="none" w="med" len="med"/>
+                    </a:lnL>
+                    <a:lnR w="12700" cap="flat" cmpd="sng" algn="ctr">
+                      <a:solidFill>
+                        <a:schemeClr val="tx1"/>
+                      </a:solidFill>
+                      <a:prstDash val="solid"/>
+                      <a:round/>
+                      <a:headEnd type="none" w="med" len="med"/>
+                      <a:tailEnd type="none" w="med" len="med"/>
+                    </a:lnR>
+                    <a:lnT w="12700" cap="flat" cmpd="sng" algn="ctr">
+                      <a:solidFill>
+                        <a:schemeClr val="tx1"/>
+                      </a:solidFill>
+                      <a:prstDash val="solid"/>
+                      <a:round/>
+                      <a:headEnd type="none" w="med" len="med"/>
+                      <a:tailEnd type="none" w="med" len="med"/>
+                    </a:lnT>
+                    <a:lnB w="12700" cap="flat" cmpd="sng" algn="ctr">
+                      <a:solidFill>
+                        <a:schemeClr val="tx1"/>
+                      </a:solidFill>
+                      <a:prstDash val="solid"/>
+                      <a:round/>
+                      <a:headEnd type="none" w="med" len="med"/>
+                      <a:tailEnd type="none" w="med" len="med"/>
+                    </a:lnB>
+                  </a:tcPr>
+                </a:tc>
+                <a:tc>
+                  <a:txBody>
+                    <a:bodyPr/>
+                    <a:lstStyle/>
+                    <a:p>
+                      <a:pPr algn="r" fontAlgn="b"/>
+                      <a:r>
+                        <a:rPr lang="tr-TR" sz="1600" u="none" strike="noStrike" dirty="0">
+                          <a:effectLst/>
+                        </a:rPr>
+                        <a:t>1</a:t>
+                      </a:r>
+                      <a:endParaRPr lang="tr-TR" sz="1600" b="0" i="0" u="none" strike="noStrike" dirty="0">
+                        <a:solidFill>
+                          <a:srgbClr val="000000"/>
+                        </a:solidFill>
+                        <a:effectLst/>
+                        <a:latin typeface="Calibri" panose="020F0502020204030204" pitchFamily="34" charset="0"/>
+                      </a:endParaRPr>
+                    </a:p>
+                  </a:txBody>
+                  <a:tcPr marL="9525" marR="9525" marT="9525" marB="0" anchor="b">
+                    <a:lnL w="12700" cap="flat" cmpd="sng" algn="ctr">
+                      <a:solidFill>
+                        <a:schemeClr val="tx1"/>
+                      </a:solidFill>
+                      <a:prstDash val="solid"/>
+                      <a:round/>
+                      <a:headEnd type="none" w="med" len="med"/>
+                      <a:tailEnd type="none" w="med" len="med"/>
+                    </a:lnL>
+                    <a:lnR w="12700" cap="flat" cmpd="sng" algn="ctr">
+                      <a:solidFill>
+                        <a:schemeClr val="tx1"/>
+                      </a:solidFill>
+                      <a:prstDash val="solid"/>
+                      <a:round/>
+                      <a:headEnd type="none" w="med" len="med"/>
+                      <a:tailEnd type="none" w="med" len="med"/>
+                    </a:lnR>
+                    <a:lnT w="12700" cap="flat" cmpd="sng" algn="ctr">
+                      <a:solidFill>
+                        <a:schemeClr val="tx1"/>
+                      </a:solidFill>
+                      <a:prstDash val="solid"/>
+                      <a:round/>
+                      <a:headEnd type="none" w="med" len="med"/>
+                      <a:tailEnd type="none" w="med" len="med"/>
+                    </a:lnT>
+                    <a:lnB w="12700" cap="flat" cmpd="sng" algn="ctr">
+                      <a:solidFill>
+                        <a:schemeClr val="tx1"/>
+                      </a:solidFill>
+                      <a:prstDash val="solid"/>
+                      <a:round/>
+                      <a:headEnd type="none" w="med" len="med"/>
+                      <a:tailEnd type="none" w="med" len="med"/>
+                    </a:lnB>
+                  </a:tcPr>
+                </a:tc>
+                <a:tc>
+                  <a:txBody>
+                    <a:bodyPr/>
+                    <a:lstStyle/>
+                    <a:p>
+                      <a:pPr algn="l" fontAlgn="b"/>
+                      <a:endParaRPr lang="tr-TR" sz="1600" b="0" i="0" u="none" strike="noStrike">
+                        <a:solidFill>
+                          <a:srgbClr val="000000"/>
+                        </a:solidFill>
+                        <a:effectLst/>
+                        <a:latin typeface="Calibri" panose="020F0502020204030204" pitchFamily="34" charset="0"/>
+                      </a:endParaRPr>
+                    </a:p>
+                  </a:txBody>
+                  <a:tcPr marL="9525" marR="9525" marT="9525" marB="0" anchor="b">
+                    <a:lnL w="12700" cap="flat" cmpd="sng" algn="ctr">
+                      <a:solidFill>
+                        <a:schemeClr val="tx1"/>
+                      </a:solidFill>
+                      <a:prstDash val="solid"/>
+                      <a:round/>
+                      <a:headEnd type="none" w="med" len="med"/>
+                      <a:tailEnd type="none" w="med" len="med"/>
+                    </a:lnL>
+                    <a:lnR w="12700" cap="flat" cmpd="sng" algn="ctr">
+                      <a:solidFill>
+                        <a:schemeClr val="tx1"/>
+                      </a:solidFill>
+                      <a:prstDash val="solid"/>
+                      <a:round/>
+                      <a:headEnd type="none" w="med" len="med"/>
+                      <a:tailEnd type="none" w="med" len="med"/>
+                    </a:lnR>
+                  </a:tcPr>
+                </a:tc>
+                <a:tc>
+                  <a:txBody>
+                    <a:bodyPr/>
+                    <a:lstStyle/>
+                    <a:p>
+                      <a:pPr algn="l" fontAlgn="b"/>
+                      <a:r>
+                        <a:rPr lang="tr-TR" sz="1600" u="none" strike="noStrike" dirty="0">
+                          <a:effectLst/>
+                        </a:rPr>
+                        <a:t>FN</a:t>
+                      </a:r>
+                      <a:endParaRPr lang="tr-TR" sz="1600" b="0" i="0" u="none" strike="noStrike" dirty="0">
+                        <a:solidFill>
+                          <a:srgbClr val="000000"/>
+                        </a:solidFill>
+                        <a:effectLst/>
+                        <a:latin typeface="Calibri" panose="020F0502020204030204" pitchFamily="34" charset="0"/>
+                      </a:endParaRPr>
+                    </a:p>
+                  </a:txBody>
+                  <a:tcPr marL="9525" marR="9525" marT="9525" marB="0" anchor="b">
+                    <a:lnL w="12700" cap="flat" cmpd="sng" algn="ctr">
+                      <a:solidFill>
+                        <a:schemeClr val="tx1"/>
+                      </a:solidFill>
+                      <a:prstDash val="solid"/>
+                      <a:round/>
+                      <a:headEnd type="none" w="med" len="med"/>
+                      <a:tailEnd type="none" w="med" len="med"/>
+                    </a:lnL>
+                    <a:lnR w="12700" cap="flat" cmpd="sng" algn="ctr">
+                      <a:solidFill>
+                        <a:schemeClr val="tx1"/>
+                      </a:solidFill>
+                      <a:prstDash val="solid"/>
+                      <a:round/>
+                      <a:headEnd type="none" w="med" len="med"/>
+                      <a:tailEnd type="none" w="med" len="med"/>
+                    </a:lnR>
+                    <a:lnT w="12700" cap="flat" cmpd="sng" algn="ctr">
+                      <a:solidFill>
+                        <a:schemeClr val="tx1"/>
+                      </a:solidFill>
+                      <a:prstDash val="solid"/>
+                      <a:round/>
+                      <a:headEnd type="none" w="med" len="med"/>
+                      <a:tailEnd type="none" w="med" len="med"/>
+                    </a:lnT>
+                    <a:lnB w="12700" cap="flat" cmpd="sng" algn="ctr">
+                      <a:solidFill>
+                        <a:schemeClr val="tx1"/>
+                      </a:solidFill>
+                      <a:prstDash val="solid"/>
+                      <a:round/>
+                      <a:headEnd type="none" w="med" len="med"/>
+                      <a:tailEnd type="none" w="med" len="med"/>
+                    </a:lnB>
+                    <a:solidFill>
+                      <a:schemeClr val="accent4">
+                        <a:lumMod val="20000"/>
+                        <a:lumOff val="80000"/>
+                      </a:schemeClr>
+                    </a:solidFill>
+                  </a:tcPr>
+                </a:tc>
+                <a:tc>
+                  <a:txBody>
+                    <a:bodyPr/>
+                    <a:lstStyle/>
+                    <a:p>
+                      <a:pPr algn="r" fontAlgn="b"/>
+                      <a:r>
+                        <a:rPr lang="tr-TR" sz="1600" u="none" strike="noStrike" dirty="0">
+                          <a:effectLst/>
+                        </a:rPr>
+                        <a:t>0</a:t>
+                      </a:r>
+                      <a:endParaRPr lang="tr-TR" sz="1600" b="0" i="0" u="none" strike="noStrike" dirty="0">
+                        <a:solidFill>
+                          <a:srgbClr val="000000"/>
+                        </a:solidFill>
+                        <a:effectLst/>
+                        <a:latin typeface="Calibri" panose="020F0502020204030204" pitchFamily="34" charset="0"/>
+                      </a:endParaRPr>
+                    </a:p>
+                  </a:txBody>
+                  <a:tcPr marL="9525" marR="9525" marT="9525" marB="0" anchor="b">
+                    <a:lnL w="12700" cap="flat" cmpd="sng" algn="ctr">
+                      <a:solidFill>
+                        <a:schemeClr val="tx1"/>
+                      </a:solidFill>
+                      <a:prstDash val="solid"/>
+                      <a:round/>
+                      <a:headEnd type="none" w="med" len="med"/>
+                      <a:tailEnd type="none" w="med" len="med"/>
+                    </a:lnL>
+                    <a:lnR w="12700" cap="flat" cmpd="sng" algn="ctr">
+                      <a:solidFill>
+                        <a:schemeClr val="tx1"/>
+                      </a:solidFill>
+                      <a:prstDash val="solid"/>
+                      <a:round/>
+                      <a:headEnd type="none" w="med" len="med"/>
+                      <a:tailEnd type="none" w="med" len="med"/>
+                    </a:lnR>
+                    <a:lnT w="12700" cap="flat" cmpd="sng" algn="ctr">
+                      <a:solidFill>
+                        <a:schemeClr val="tx1"/>
+                      </a:solidFill>
+                      <a:prstDash val="solid"/>
+                      <a:round/>
+                      <a:headEnd type="none" w="med" len="med"/>
+                      <a:tailEnd type="none" w="med" len="med"/>
+                    </a:lnT>
+                    <a:lnB w="12700" cap="flat" cmpd="sng" algn="ctr">
+                      <a:solidFill>
+                        <a:schemeClr val="tx1"/>
+                      </a:solidFill>
+                      <a:prstDash val="solid"/>
+                      <a:round/>
+                      <a:headEnd type="none" w="med" len="med"/>
+                      <a:tailEnd type="none" w="med" len="med"/>
+                    </a:lnB>
+                    <a:solidFill>
+                      <a:schemeClr val="accent4">
+                        <a:lumMod val="20000"/>
+                        <a:lumOff val="80000"/>
+                      </a:schemeClr>
+                    </a:solidFill>
+                  </a:tcPr>
+                </a:tc>
+                <a:tc>
+                  <a:txBody>
+                    <a:bodyPr/>
+                    <a:lstStyle/>
+                    <a:p>
+                      <a:pPr algn="l" fontAlgn="b"/>
+                      <a:endParaRPr lang="tr-TR" sz="1600" b="0" i="0" u="none" strike="noStrike">
+                        <a:solidFill>
+                          <a:srgbClr val="000000"/>
+                        </a:solidFill>
+                        <a:effectLst/>
+                        <a:latin typeface="Calibri" panose="020F0502020204030204" pitchFamily="34" charset="0"/>
+                      </a:endParaRPr>
+                    </a:p>
+                  </a:txBody>
+                  <a:tcPr marL="9525" marR="9525" marT="9525" marB="0" anchor="b">
+                    <a:lnL w="12700" cap="flat" cmpd="sng" algn="ctr">
+                      <a:solidFill>
+                        <a:schemeClr val="tx1"/>
+                      </a:solidFill>
+                      <a:prstDash val="solid"/>
+                      <a:round/>
+                      <a:headEnd type="none" w="med" len="med"/>
+                      <a:tailEnd type="none" w="med" len="med"/>
+                    </a:lnL>
+                    <a:lnR w="12700" cap="flat" cmpd="sng" algn="ctr">
+                      <a:solidFill>
+                        <a:schemeClr val="tx1"/>
+                      </a:solidFill>
+                      <a:prstDash val="solid"/>
+                      <a:round/>
+                      <a:headEnd type="none" w="med" len="med"/>
+                      <a:tailEnd type="none" w="med" len="med"/>
+                    </a:lnR>
+                  </a:tcPr>
+                </a:tc>
+                <a:tc>
+                  <a:txBody>
+                    <a:bodyPr/>
+                    <a:lstStyle/>
+                    <a:p>
+                      <a:pPr algn="l" fontAlgn="b"/>
+                      <a:r>
+                        <a:rPr lang="tr-TR" sz="1600" u="none" strike="noStrike">
+                          <a:effectLst/>
+                        </a:rPr>
+                        <a:t>FN</a:t>
+                      </a:r>
+                      <a:endParaRPr lang="tr-TR" sz="1600" b="0" i="0" u="none" strike="noStrike">
+                        <a:solidFill>
+                          <a:srgbClr val="000000"/>
+                        </a:solidFill>
+                        <a:effectLst/>
+                        <a:latin typeface="Calibri" panose="020F0502020204030204" pitchFamily="34" charset="0"/>
+                      </a:endParaRPr>
+                    </a:p>
+                  </a:txBody>
+                  <a:tcPr marL="9525" marR="9525" marT="9525" marB="0" anchor="b">
+                    <a:lnL w="12700" cap="flat" cmpd="sng" algn="ctr">
+                      <a:solidFill>
+                        <a:schemeClr val="tx1"/>
+                      </a:solidFill>
+                      <a:prstDash val="solid"/>
+                      <a:round/>
+                      <a:headEnd type="none" w="med" len="med"/>
+                      <a:tailEnd type="none" w="med" len="med"/>
+                    </a:lnL>
+                    <a:lnR w="12700" cap="flat" cmpd="sng" algn="ctr">
+                      <a:solidFill>
+                        <a:schemeClr val="tx1"/>
+                      </a:solidFill>
+                      <a:prstDash val="solid"/>
+                      <a:round/>
+                      <a:headEnd type="none" w="med" len="med"/>
+                      <a:tailEnd type="none" w="med" len="med"/>
+                    </a:lnR>
+                    <a:lnT w="12700" cap="flat" cmpd="sng" algn="ctr">
+                      <a:solidFill>
+                        <a:schemeClr val="tx1"/>
+                      </a:solidFill>
+                      <a:prstDash val="solid"/>
+                      <a:round/>
+                      <a:headEnd type="none" w="med" len="med"/>
+                      <a:tailEnd type="none" w="med" len="med"/>
+                    </a:lnT>
+                    <a:lnB w="12700" cap="flat" cmpd="sng" algn="ctr">
+                      <a:solidFill>
+                        <a:schemeClr val="tx1"/>
+                      </a:solidFill>
+                      <a:prstDash val="solid"/>
+                      <a:round/>
+                      <a:headEnd type="none" w="med" len="med"/>
+                      <a:tailEnd type="none" w="med" len="med"/>
+                    </a:lnB>
+                  </a:tcPr>
+                </a:tc>
+                <a:tc>
+                  <a:txBody>
+                    <a:bodyPr/>
+                    <a:lstStyle/>
+                    <a:p>
+                      <a:pPr algn="r" fontAlgn="b"/>
+                      <a:r>
+                        <a:rPr lang="tr-TR" sz="1600" u="none" strike="noStrike" dirty="0">
+                          <a:effectLst/>
+                        </a:rPr>
+                        <a:t>3</a:t>
+                      </a:r>
+                      <a:endParaRPr lang="tr-TR" sz="1600" b="0" i="0" u="none" strike="noStrike" dirty="0">
+                        <a:solidFill>
+                          <a:srgbClr val="000000"/>
+                        </a:solidFill>
+                        <a:effectLst/>
+                        <a:latin typeface="Calibri" panose="020F0502020204030204" pitchFamily="34" charset="0"/>
+                      </a:endParaRPr>
+                    </a:p>
+                  </a:txBody>
+                  <a:tcPr marL="9525" marR="9525" marT="9525" marB="0" anchor="b">
+                    <a:lnL w="12700" cap="flat" cmpd="sng" algn="ctr">
+                      <a:solidFill>
+                        <a:schemeClr val="tx1"/>
+                      </a:solidFill>
+                      <a:prstDash val="solid"/>
+                      <a:round/>
+                      <a:headEnd type="none" w="med" len="med"/>
+                      <a:tailEnd type="none" w="med" len="med"/>
+                    </a:lnL>
+                    <a:lnR w="12700" cap="flat" cmpd="sng" algn="ctr">
+                      <a:solidFill>
+                        <a:schemeClr val="tx1"/>
+                      </a:solidFill>
+                      <a:prstDash val="solid"/>
+                      <a:round/>
+                      <a:headEnd type="none" w="med" len="med"/>
+                      <a:tailEnd type="none" w="med" len="med"/>
+                    </a:lnR>
+                    <a:lnT w="12700" cap="flat" cmpd="sng" algn="ctr">
+                      <a:solidFill>
+                        <a:schemeClr val="tx1"/>
+                      </a:solidFill>
+                      <a:prstDash val="solid"/>
+                      <a:round/>
+                      <a:headEnd type="none" w="med" len="med"/>
+                      <a:tailEnd type="none" w="med" len="med"/>
+                    </a:lnT>
+                    <a:lnB w="12700" cap="flat" cmpd="sng" algn="ctr">
+                      <a:solidFill>
+                        <a:schemeClr val="tx1"/>
+                      </a:solidFill>
+                      <a:prstDash val="solid"/>
+                      <a:round/>
+                      <a:headEnd type="none" w="med" len="med"/>
+                      <a:tailEnd type="none" w="med" len="med"/>
+                    </a:lnB>
+                  </a:tcPr>
+                </a:tc>
+                <a:extLst>
+                  <a:ext uri="{0D108BD9-81ED-4DB2-BD59-A6C34878D82A}">
+                    <a16:rowId xmlns:a16="http://schemas.microsoft.com/office/drawing/2014/main" val="617214861"/>
+                  </a:ext>
+                </a:extLst>
+              </a:tr>
+              <a:tr h="267050">
+                <a:tc>
+                  <a:txBody>
+                    <a:bodyPr/>
+                    <a:lstStyle/>
+                    <a:p>
+                      <a:pPr algn="l" fontAlgn="b"/>
+                      <a:r>
+                        <a:rPr lang="tr-TR" sz="1600" u="none" strike="noStrike">
+                          <a:effectLst/>
+                        </a:rPr>
+                        <a:t>Accuracy</a:t>
+                      </a:r>
+                      <a:endParaRPr lang="tr-TR" sz="1600" b="0" i="0" u="none" strike="noStrike">
+                        <a:solidFill>
+                          <a:srgbClr val="000000"/>
+                        </a:solidFill>
+                        <a:effectLst/>
+                        <a:latin typeface="Calibri" panose="020F0502020204030204" pitchFamily="34" charset="0"/>
+                      </a:endParaRPr>
+                    </a:p>
+                  </a:txBody>
+                  <a:tcPr marL="9525" marR="9525" marT="9525" marB="0" anchor="b">
+                    <a:lnL w="12700" cap="flat" cmpd="sng" algn="ctr">
+                      <a:solidFill>
+                        <a:schemeClr val="tx1"/>
+                      </a:solidFill>
+                      <a:prstDash val="solid"/>
+                      <a:round/>
+                      <a:headEnd type="none" w="med" len="med"/>
+                      <a:tailEnd type="none" w="med" len="med"/>
+                    </a:lnL>
+                    <a:lnR w="12700" cap="flat" cmpd="sng" algn="ctr">
+                      <a:solidFill>
+                        <a:schemeClr val="tx1"/>
+                      </a:solidFill>
+                      <a:prstDash val="solid"/>
+                      <a:round/>
+                      <a:headEnd type="none" w="med" len="med"/>
+                      <a:tailEnd type="none" w="med" len="med"/>
+                    </a:lnR>
+                    <a:lnT w="12700" cap="flat" cmpd="sng" algn="ctr">
+                      <a:solidFill>
+                        <a:schemeClr val="tx1"/>
+                      </a:solidFill>
+                      <a:prstDash val="solid"/>
+                      <a:round/>
+                      <a:headEnd type="none" w="med" len="med"/>
+                      <a:tailEnd type="none" w="med" len="med"/>
+                    </a:lnT>
+                    <a:lnB w="12700" cap="flat" cmpd="sng" algn="ctr">
+                      <a:solidFill>
+                        <a:schemeClr val="tx1"/>
+                      </a:solidFill>
+                      <a:prstDash val="solid"/>
+                      <a:round/>
+                      <a:headEnd type="none" w="med" len="med"/>
+                      <a:tailEnd type="none" w="med" len="med"/>
+                    </a:lnB>
+                  </a:tcPr>
+                </a:tc>
+                <a:tc>
+                  <a:txBody>
+                    <a:bodyPr/>
+                    <a:lstStyle/>
+                    <a:p>
+                      <a:pPr algn="r" fontAlgn="b"/>
+                      <a:r>
+                        <a:rPr lang="tr-TR" sz="1600" u="none" strike="noStrike">
+                          <a:effectLst/>
+                        </a:rPr>
+                        <a:t>0,8500</a:t>
+                      </a:r>
+                      <a:endParaRPr lang="tr-TR" sz="1600" b="0" i="0" u="none" strike="noStrike">
+                        <a:solidFill>
+                          <a:srgbClr val="000000"/>
+                        </a:solidFill>
+                        <a:effectLst/>
+                        <a:latin typeface="Calibri" panose="020F0502020204030204" pitchFamily="34" charset="0"/>
+                      </a:endParaRPr>
+                    </a:p>
+                  </a:txBody>
+                  <a:tcPr marL="9525" marR="9525" marT="9525" marB="0" anchor="b">
+                    <a:lnL w="12700" cap="flat" cmpd="sng" algn="ctr">
+                      <a:solidFill>
+                        <a:schemeClr val="tx1"/>
+                      </a:solidFill>
+                      <a:prstDash val="solid"/>
+                      <a:round/>
+                      <a:headEnd type="none" w="med" len="med"/>
+                      <a:tailEnd type="none" w="med" len="med"/>
+                    </a:lnL>
+                    <a:lnR w="12700" cap="flat" cmpd="sng" algn="ctr">
+                      <a:solidFill>
+                        <a:schemeClr val="tx1"/>
+                      </a:solidFill>
+                      <a:prstDash val="solid"/>
+                      <a:round/>
+                      <a:headEnd type="none" w="med" len="med"/>
+                      <a:tailEnd type="none" w="med" len="med"/>
+                    </a:lnR>
+                    <a:lnT w="12700" cap="flat" cmpd="sng" algn="ctr">
+                      <a:solidFill>
+                        <a:schemeClr val="tx1"/>
+                      </a:solidFill>
+                      <a:prstDash val="solid"/>
+                      <a:round/>
+                      <a:headEnd type="none" w="med" len="med"/>
+                      <a:tailEnd type="none" w="med" len="med"/>
+                    </a:lnT>
+                    <a:lnB w="12700" cap="flat" cmpd="sng" algn="ctr">
+                      <a:solidFill>
+                        <a:schemeClr val="tx1"/>
+                      </a:solidFill>
+                      <a:prstDash val="solid"/>
+                      <a:round/>
+                      <a:headEnd type="none" w="med" len="med"/>
+                      <a:tailEnd type="none" w="med" len="med"/>
+                    </a:lnB>
+                  </a:tcPr>
+                </a:tc>
+                <a:tc>
+                  <a:txBody>
+                    <a:bodyPr/>
+                    <a:lstStyle/>
+                    <a:p>
+                      <a:pPr algn="l" fontAlgn="b"/>
+                      <a:endParaRPr lang="tr-TR" sz="1600" b="0" i="0" u="none" strike="noStrike">
+                        <a:solidFill>
+                          <a:srgbClr val="000000"/>
+                        </a:solidFill>
+                        <a:effectLst/>
+                        <a:latin typeface="Calibri" panose="020F0502020204030204" pitchFamily="34" charset="0"/>
+                      </a:endParaRPr>
+                    </a:p>
+                  </a:txBody>
+                  <a:tcPr marL="9525" marR="9525" marT="9525" marB="0" anchor="b">
+                    <a:lnL w="12700" cap="flat" cmpd="sng" algn="ctr">
+                      <a:solidFill>
+                        <a:schemeClr val="tx1"/>
+                      </a:solidFill>
+                      <a:prstDash val="solid"/>
+                      <a:round/>
+                      <a:headEnd type="none" w="med" len="med"/>
+                      <a:tailEnd type="none" w="med" len="med"/>
+                    </a:lnL>
+                    <a:lnR w="12700" cap="flat" cmpd="sng" algn="ctr">
+                      <a:solidFill>
+                        <a:schemeClr val="tx1"/>
+                      </a:solidFill>
+                      <a:prstDash val="solid"/>
+                      <a:round/>
+                      <a:headEnd type="none" w="med" len="med"/>
+                      <a:tailEnd type="none" w="med" len="med"/>
+                    </a:lnR>
+                  </a:tcPr>
+                </a:tc>
+                <a:tc>
+                  <a:txBody>
+                    <a:bodyPr/>
+                    <a:lstStyle/>
+                    <a:p>
+                      <a:pPr algn="l" fontAlgn="b"/>
+                      <a:r>
+                        <a:rPr lang="tr-TR" sz="1600" u="none" strike="noStrike" dirty="0" err="1">
+                          <a:effectLst/>
+                        </a:rPr>
+                        <a:t>Accuracy</a:t>
+                      </a:r>
+                      <a:endParaRPr lang="tr-TR" sz="1600" b="0" i="0" u="none" strike="noStrike" dirty="0">
+                        <a:solidFill>
+                          <a:srgbClr val="000000"/>
+                        </a:solidFill>
+                        <a:effectLst/>
+                        <a:latin typeface="Calibri" panose="020F0502020204030204" pitchFamily="34" charset="0"/>
+                      </a:endParaRPr>
+                    </a:p>
+                  </a:txBody>
+                  <a:tcPr marL="9525" marR="9525" marT="9525" marB="0" anchor="b">
+                    <a:lnL w="12700" cap="flat" cmpd="sng" algn="ctr">
+                      <a:solidFill>
+                        <a:schemeClr val="tx1"/>
+                      </a:solidFill>
+                      <a:prstDash val="solid"/>
+                      <a:round/>
+                      <a:headEnd type="none" w="med" len="med"/>
+                      <a:tailEnd type="none" w="med" len="med"/>
+                    </a:lnL>
+                    <a:lnR w="12700" cap="flat" cmpd="sng" algn="ctr">
+                      <a:solidFill>
+                        <a:schemeClr val="tx1"/>
+                      </a:solidFill>
+                      <a:prstDash val="solid"/>
+                      <a:round/>
+                      <a:headEnd type="none" w="med" len="med"/>
+                      <a:tailEnd type="none" w="med" len="med"/>
+                    </a:lnR>
+                    <a:lnT w="12700" cap="flat" cmpd="sng" algn="ctr">
+                      <a:solidFill>
+                        <a:schemeClr val="tx1"/>
+                      </a:solidFill>
+                      <a:prstDash val="solid"/>
+                      <a:round/>
+                      <a:headEnd type="none" w="med" len="med"/>
+                      <a:tailEnd type="none" w="med" len="med"/>
+                    </a:lnT>
+                    <a:lnB w="12700" cap="flat" cmpd="sng" algn="ctr">
+                      <a:solidFill>
+                        <a:schemeClr val="tx1"/>
+                      </a:solidFill>
+                      <a:prstDash val="solid"/>
+                      <a:round/>
+                      <a:headEnd type="none" w="med" len="med"/>
+                      <a:tailEnd type="none" w="med" len="med"/>
+                    </a:lnB>
+                  </a:tcPr>
+                </a:tc>
+                <a:tc>
+                  <a:txBody>
+                    <a:bodyPr/>
+                    <a:lstStyle/>
+                    <a:p>
+                      <a:pPr algn="r" fontAlgn="b"/>
+                      <a:r>
+                        <a:rPr lang="tr-TR" sz="1600" u="none" strike="noStrike">
+                          <a:effectLst/>
+                        </a:rPr>
+                        <a:t>0,6000</a:t>
+                      </a:r>
+                      <a:endParaRPr lang="tr-TR" sz="1600" b="0" i="0" u="none" strike="noStrike">
+                        <a:solidFill>
+                          <a:srgbClr val="000000"/>
+                        </a:solidFill>
+                        <a:effectLst/>
+                        <a:latin typeface="Calibri" panose="020F0502020204030204" pitchFamily="34" charset="0"/>
+                      </a:endParaRPr>
+                    </a:p>
+                  </a:txBody>
+                  <a:tcPr marL="9525" marR="9525" marT="9525" marB="0" anchor="b">
+                    <a:lnL w="12700" cap="flat" cmpd="sng" algn="ctr">
+                      <a:solidFill>
+                        <a:schemeClr val="tx1"/>
+                      </a:solidFill>
+                      <a:prstDash val="solid"/>
+                      <a:round/>
+                      <a:headEnd type="none" w="med" len="med"/>
+                      <a:tailEnd type="none" w="med" len="med"/>
+                    </a:lnL>
+                    <a:lnR w="12700" cap="flat" cmpd="sng" algn="ctr">
+                      <a:solidFill>
+                        <a:schemeClr val="tx1"/>
+                      </a:solidFill>
+                      <a:prstDash val="solid"/>
+                      <a:round/>
+                      <a:headEnd type="none" w="med" len="med"/>
+                      <a:tailEnd type="none" w="med" len="med"/>
+                    </a:lnR>
+                    <a:lnT w="12700" cap="flat" cmpd="sng" algn="ctr">
+                      <a:solidFill>
+                        <a:schemeClr val="tx1"/>
+                      </a:solidFill>
+                      <a:prstDash val="solid"/>
+                      <a:round/>
+                      <a:headEnd type="none" w="med" len="med"/>
+                      <a:tailEnd type="none" w="med" len="med"/>
+                    </a:lnT>
+                    <a:lnB w="12700" cap="flat" cmpd="sng" algn="ctr">
+                      <a:solidFill>
+                        <a:schemeClr val="tx1"/>
+                      </a:solidFill>
+                      <a:prstDash val="solid"/>
+                      <a:round/>
+                      <a:headEnd type="none" w="med" len="med"/>
+                      <a:tailEnd type="none" w="med" len="med"/>
+                    </a:lnB>
+                  </a:tcPr>
+                </a:tc>
+                <a:tc>
+                  <a:txBody>
+                    <a:bodyPr/>
+                    <a:lstStyle/>
+                    <a:p>
+                      <a:pPr algn="l" fontAlgn="b"/>
+                      <a:endParaRPr lang="tr-TR" sz="1600" b="0" i="0" u="none" strike="noStrike">
+                        <a:solidFill>
+                          <a:srgbClr val="000000"/>
+                        </a:solidFill>
+                        <a:effectLst/>
+                        <a:latin typeface="Calibri" panose="020F0502020204030204" pitchFamily="34" charset="0"/>
+                      </a:endParaRPr>
+                    </a:p>
+                  </a:txBody>
+                  <a:tcPr marL="9525" marR="9525" marT="9525" marB="0" anchor="b">
+                    <a:lnL w="12700" cap="flat" cmpd="sng" algn="ctr">
+                      <a:solidFill>
+                        <a:schemeClr val="tx1"/>
+                      </a:solidFill>
+                      <a:prstDash val="solid"/>
+                      <a:round/>
+                      <a:headEnd type="none" w="med" len="med"/>
+                      <a:tailEnd type="none" w="med" len="med"/>
+                    </a:lnL>
+                    <a:lnR w="12700" cap="flat" cmpd="sng" algn="ctr">
+                      <a:solidFill>
+                        <a:schemeClr val="tx1"/>
+                      </a:solidFill>
+                      <a:prstDash val="solid"/>
+                      <a:round/>
+                      <a:headEnd type="none" w="med" len="med"/>
+                      <a:tailEnd type="none" w="med" len="med"/>
+                    </a:lnR>
+                  </a:tcPr>
+                </a:tc>
+                <a:tc>
+                  <a:txBody>
+                    <a:bodyPr/>
+                    <a:lstStyle/>
+                    <a:p>
+                      <a:pPr algn="l" fontAlgn="b"/>
+                      <a:r>
+                        <a:rPr lang="tr-TR" sz="1600" u="none" strike="noStrike">
+                          <a:effectLst/>
+                        </a:rPr>
+                        <a:t>Accuracy</a:t>
+                      </a:r>
+                      <a:endParaRPr lang="tr-TR" sz="1600" b="0" i="0" u="none" strike="noStrike">
+                        <a:solidFill>
+                          <a:srgbClr val="000000"/>
+                        </a:solidFill>
+                        <a:effectLst/>
+                        <a:latin typeface="Calibri" panose="020F0502020204030204" pitchFamily="34" charset="0"/>
+                      </a:endParaRPr>
+                    </a:p>
+                  </a:txBody>
+                  <a:tcPr marL="9525" marR="9525" marT="9525" marB="0" anchor="b">
+                    <a:lnL w="12700" cap="flat" cmpd="sng" algn="ctr">
+                      <a:solidFill>
+                        <a:schemeClr val="tx1"/>
+                      </a:solidFill>
+                      <a:prstDash val="solid"/>
+                      <a:round/>
+                      <a:headEnd type="none" w="med" len="med"/>
+                      <a:tailEnd type="none" w="med" len="med"/>
+                    </a:lnL>
+                    <a:lnR w="12700" cap="flat" cmpd="sng" algn="ctr">
+                      <a:solidFill>
+                        <a:schemeClr val="tx1"/>
+                      </a:solidFill>
+                      <a:prstDash val="solid"/>
+                      <a:round/>
+                      <a:headEnd type="none" w="med" len="med"/>
+                      <a:tailEnd type="none" w="med" len="med"/>
+                    </a:lnR>
+                    <a:lnT w="12700" cap="flat" cmpd="sng" algn="ctr">
+                      <a:solidFill>
+                        <a:schemeClr val="tx1"/>
+                      </a:solidFill>
+                      <a:prstDash val="solid"/>
+                      <a:round/>
+                      <a:headEnd type="none" w="med" len="med"/>
+                      <a:tailEnd type="none" w="med" len="med"/>
+                    </a:lnT>
+                    <a:lnB w="12700" cap="flat" cmpd="sng" algn="ctr">
+                      <a:solidFill>
+                        <a:schemeClr val="tx1"/>
+                      </a:solidFill>
+                      <a:prstDash val="solid"/>
+                      <a:round/>
+                      <a:headEnd type="none" w="med" len="med"/>
+                      <a:tailEnd type="none" w="med" len="med"/>
+                    </a:lnB>
+                  </a:tcPr>
+                </a:tc>
+                <a:tc>
+                  <a:txBody>
+                    <a:bodyPr/>
+                    <a:lstStyle/>
+                    <a:p>
+                      <a:pPr algn="r" fontAlgn="b"/>
+                      <a:r>
+                        <a:rPr lang="tr-TR" sz="1600" u="none" strike="noStrike" dirty="0">
+                          <a:effectLst/>
+                        </a:rPr>
+                        <a:t>0,8500</a:t>
+                      </a:r>
+                      <a:endParaRPr lang="tr-TR" sz="1600" b="0" i="0" u="none" strike="noStrike" dirty="0">
+                        <a:solidFill>
+                          <a:srgbClr val="000000"/>
+                        </a:solidFill>
+                        <a:effectLst/>
+                        <a:latin typeface="Calibri" panose="020F0502020204030204" pitchFamily="34" charset="0"/>
+                      </a:endParaRPr>
+                    </a:p>
+                  </a:txBody>
+                  <a:tcPr marL="9525" marR="9525" marT="9525" marB="0" anchor="b">
+                    <a:lnL w="12700" cap="flat" cmpd="sng" algn="ctr">
+                      <a:solidFill>
+                        <a:schemeClr val="tx1"/>
+                      </a:solidFill>
+                      <a:prstDash val="solid"/>
+                      <a:round/>
+                      <a:headEnd type="none" w="med" len="med"/>
+                      <a:tailEnd type="none" w="med" len="med"/>
+                    </a:lnL>
+                    <a:lnR w="12700" cap="flat" cmpd="sng" algn="ctr">
+                      <a:solidFill>
+                        <a:schemeClr val="tx1"/>
+                      </a:solidFill>
+                      <a:prstDash val="solid"/>
+                      <a:round/>
+                      <a:headEnd type="none" w="med" len="med"/>
+                      <a:tailEnd type="none" w="med" len="med"/>
+                    </a:lnR>
+                    <a:lnT w="12700" cap="flat" cmpd="sng" algn="ctr">
+                      <a:solidFill>
+                        <a:schemeClr val="tx1"/>
+                      </a:solidFill>
+                      <a:prstDash val="solid"/>
+                      <a:round/>
+                      <a:headEnd type="none" w="med" len="med"/>
+                      <a:tailEnd type="none" w="med" len="med"/>
+                    </a:lnT>
+                    <a:lnB w="12700" cap="flat" cmpd="sng" algn="ctr">
+                      <a:solidFill>
+                        <a:schemeClr val="tx1"/>
+                      </a:solidFill>
+                      <a:prstDash val="solid"/>
+                      <a:round/>
+                      <a:headEnd type="none" w="med" len="med"/>
+                      <a:tailEnd type="none" w="med" len="med"/>
+                    </a:lnB>
+                  </a:tcPr>
+                </a:tc>
+                <a:extLst>
+                  <a:ext uri="{0D108BD9-81ED-4DB2-BD59-A6C34878D82A}">
+                    <a16:rowId xmlns:a16="http://schemas.microsoft.com/office/drawing/2014/main" val="2793627082"/>
+                  </a:ext>
+                </a:extLst>
+              </a:tr>
+              <a:tr h="267050">
+                <a:tc>
+                  <a:txBody>
+                    <a:bodyPr/>
+                    <a:lstStyle/>
+                    <a:p>
+                      <a:pPr algn="l" fontAlgn="b"/>
+                      <a:r>
+                        <a:rPr lang="tr-TR" sz="1600" u="none" strike="noStrike">
+                          <a:effectLst/>
+                        </a:rPr>
+                        <a:t>Precision</a:t>
+                      </a:r>
+                      <a:endParaRPr lang="tr-TR" sz="1600" b="0" i="0" u="none" strike="noStrike">
+                        <a:solidFill>
+                          <a:srgbClr val="000000"/>
+                        </a:solidFill>
+                        <a:effectLst/>
+                        <a:latin typeface="Calibri" panose="020F0502020204030204" pitchFamily="34" charset="0"/>
+                      </a:endParaRPr>
+                    </a:p>
+                  </a:txBody>
+                  <a:tcPr marL="9525" marR="9525" marT="9525" marB="0" anchor="b">
+                    <a:lnL w="12700" cap="flat" cmpd="sng" algn="ctr">
+                      <a:solidFill>
+                        <a:schemeClr val="tx1"/>
+                      </a:solidFill>
+                      <a:prstDash val="solid"/>
+                      <a:round/>
+                      <a:headEnd type="none" w="med" len="med"/>
+                      <a:tailEnd type="none" w="med" len="med"/>
+                    </a:lnL>
+                    <a:lnR w="12700" cap="flat" cmpd="sng" algn="ctr">
+                      <a:solidFill>
+                        <a:schemeClr val="tx1"/>
+                      </a:solidFill>
+                      <a:prstDash val="solid"/>
+                      <a:round/>
+                      <a:headEnd type="none" w="med" len="med"/>
+                      <a:tailEnd type="none" w="med" len="med"/>
+                    </a:lnR>
+                    <a:lnT w="12700" cap="flat" cmpd="sng" algn="ctr">
+                      <a:solidFill>
+                        <a:schemeClr val="tx1"/>
+                      </a:solidFill>
+                      <a:prstDash val="solid"/>
+                      <a:round/>
+                      <a:headEnd type="none" w="med" len="med"/>
+                      <a:tailEnd type="none" w="med" len="med"/>
+                    </a:lnT>
+                    <a:lnB w="12700" cap="flat" cmpd="sng" algn="ctr">
+                      <a:solidFill>
+                        <a:schemeClr val="tx1"/>
+                      </a:solidFill>
+                      <a:prstDash val="solid"/>
+                      <a:round/>
+                      <a:headEnd type="none" w="med" len="med"/>
+                      <a:tailEnd type="none" w="med" len="med"/>
+                    </a:lnB>
+                  </a:tcPr>
+                </a:tc>
+                <a:tc>
+                  <a:txBody>
+                    <a:bodyPr/>
+                    <a:lstStyle/>
+                    <a:p>
+                      <a:pPr algn="r" fontAlgn="b"/>
+                      <a:r>
+                        <a:rPr lang="tr-TR" sz="1600" u="none" strike="noStrike" dirty="0">
+                          <a:effectLst/>
+                        </a:rPr>
+                        <a:t>0,8182</a:t>
+                      </a:r>
+                      <a:endParaRPr lang="tr-TR" sz="1600" b="0" i="0" u="none" strike="noStrike" dirty="0">
+                        <a:solidFill>
+                          <a:srgbClr val="000000"/>
+                        </a:solidFill>
+                        <a:effectLst/>
+                        <a:latin typeface="Calibri" panose="020F0502020204030204" pitchFamily="34" charset="0"/>
+                      </a:endParaRPr>
+                    </a:p>
+                  </a:txBody>
+                  <a:tcPr marL="9525" marR="9525" marT="9525" marB="0" anchor="b">
+                    <a:lnL w="12700" cap="flat" cmpd="sng" algn="ctr">
+                      <a:solidFill>
+                        <a:schemeClr val="tx1"/>
+                      </a:solidFill>
+                      <a:prstDash val="solid"/>
+                      <a:round/>
+                      <a:headEnd type="none" w="med" len="med"/>
+                      <a:tailEnd type="none" w="med" len="med"/>
+                    </a:lnL>
+                    <a:lnR w="12700" cap="flat" cmpd="sng" algn="ctr">
+                      <a:solidFill>
+                        <a:schemeClr val="tx1"/>
+                      </a:solidFill>
+                      <a:prstDash val="solid"/>
+                      <a:round/>
+                      <a:headEnd type="none" w="med" len="med"/>
+                      <a:tailEnd type="none" w="med" len="med"/>
+                    </a:lnR>
+                    <a:lnT w="12700" cap="flat" cmpd="sng" algn="ctr">
+                      <a:solidFill>
+                        <a:schemeClr val="tx1"/>
+                      </a:solidFill>
+                      <a:prstDash val="solid"/>
+                      <a:round/>
+                      <a:headEnd type="none" w="med" len="med"/>
+                      <a:tailEnd type="none" w="med" len="med"/>
+                    </a:lnT>
+                    <a:lnB w="12700" cap="flat" cmpd="sng" algn="ctr">
+                      <a:solidFill>
+                        <a:schemeClr val="tx1"/>
+                      </a:solidFill>
+                      <a:prstDash val="solid"/>
+                      <a:round/>
+                      <a:headEnd type="none" w="med" len="med"/>
+                      <a:tailEnd type="none" w="med" len="med"/>
+                    </a:lnB>
+                  </a:tcPr>
+                </a:tc>
+                <a:tc>
+                  <a:txBody>
+                    <a:bodyPr/>
+                    <a:lstStyle/>
+                    <a:p>
+                      <a:pPr algn="l" fontAlgn="b"/>
+                      <a:endParaRPr lang="tr-TR" sz="1600" b="0" i="0" u="none" strike="noStrike">
+                        <a:solidFill>
+                          <a:srgbClr val="000000"/>
+                        </a:solidFill>
+                        <a:effectLst/>
+                        <a:latin typeface="Calibri" panose="020F0502020204030204" pitchFamily="34" charset="0"/>
+                      </a:endParaRPr>
+                    </a:p>
+                  </a:txBody>
+                  <a:tcPr marL="9525" marR="9525" marT="9525" marB="0" anchor="b">
+                    <a:lnL w="12700" cap="flat" cmpd="sng" algn="ctr">
+                      <a:solidFill>
+                        <a:schemeClr val="tx1"/>
+                      </a:solidFill>
+                      <a:prstDash val="solid"/>
+                      <a:round/>
+                      <a:headEnd type="none" w="med" len="med"/>
+                      <a:tailEnd type="none" w="med" len="med"/>
+                    </a:lnL>
+                    <a:lnR w="12700" cap="flat" cmpd="sng" algn="ctr">
+                      <a:solidFill>
+                        <a:schemeClr val="tx1"/>
+                      </a:solidFill>
+                      <a:prstDash val="solid"/>
+                      <a:round/>
+                      <a:headEnd type="none" w="med" len="med"/>
+                      <a:tailEnd type="none" w="med" len="med"/>
+                    </a:lnR>
+                  </a:tcPr>
+                </a:tc>
+                <a:tc>
+                  <a:txBody>
+                    <a:bodyPr/>
+                    <a:lstStyle/>
+                    <a:p>
+                      <a:pPr algn="l" fontAlgn="b"/>
+                      <a:r>
+                        <a:rPr lang="tr-TR" sz="1600" u="none" strike="noStrike">
+                          <a:effectLst/>
+                        </a:rPr>
+                        <a:t>Precision</a:t>
+                      </a:r>
+                      <a:endParaRPr lang="tr-TR" sz="1600" b="0" i="0" u="none" strike="noStrike">
+                        <a:solidFill>
+                          <a:srgbClr val="000000"/>
+                        </a:solidFill>
+                        <a:effectLst/>
+                        <a:latin typeface="Calibri" panose="020F0502020204030204" pitchFamily="34" charset="0"/>
+                      </a:endParaRPr>
+                    </a:p>
+                  </a:txBody>
+                  <a:tcPr marL="9525" marR="9525" marT="9525" marB="0" anchor="b">
+                    <a:lnL w="12700" cap="flat" cmpd="sng" algn="ctr">
+                      <a:solidFill>
+                        <a:schemeClr val="tx1"/>
+                      </a:solidFill>
+                      <a:prstDash val="solid"/>
+                      <a:round/>
+                      <a:headEnd type="none" w="med" len="med"/>
+                      <a:tailEnd type="none" w="med" len="med"/>
+                    </a:lnL>
+                    <a:lnR w="12700" cap="flat" cmpd="sng" algn="ctr">
+                      <a:solidFill>
+                        <a:schemeClr val="tx1"/>
+                      </a:solidFill>
+                      <a:prstDash val="solid"/>
+                      <a:round/>
+                      <a:headEnd type="none" w="med" len="med"/>
+                      <a:tailEnd type="none" w="med" len="med"/>
+                    </a:lnR>
+                    <a:lnT w="12700" cap="flat" cmpd="sng" algn="ctr">
+                      <a:solidFill>
+                        <a:schemeClr val="tx1"/>
+                      </a:solidFill>
+                      <a:prstDash val="solid"/>
+                      <a:round/>
+                      <a:headEnd type="none" w="med" len="med"/>
+                      <a:tailEnd type="none" w="med" len="med"/>
+                    </a:lnT>
+                    <a:lnB w="12700" cap="flat" cmpd="sng" algn="ctr">
+                      <a:solidFill>
+                        <a:schemeClr val="tx1"/>
+                      </a:solidFill>
+                      <a:prstDash val="solid"/>
+                      <a:round/>
+                      <a:headEnd type="none" w="med" len="med"/>
+                      <a:tailEnd type="none" w="med" len="med"/>
+                    </a:lnB>
+                  </a:tcPr>
+                </a:tc>
+                <a:tc>
+                  <a:txBody>
+                    <a:bodyPr/>
+                    <a:lstStyle/>
+                    <a:p>
+                      <a:pPr algn="r" fontAlgn="b"/>
+                      <a:r>
+                        <a:rPr lang="tr-TR" sz="1600" u="none" strike="noStrike" dirty="0">
+                          <a:effectLst/>
+                        </a:rPr>
+                        <a:t>0,5556</a:t>
+                      </a:r>
+                      <a:endParaRPr lang="tr-TR" sz="1600" b="0" i="0" u="none" strike="noStrike" dirty="0">
+                        <a:solidFill>
+                          <a:srgbClr val="000000"/>
+                        </a:solidFill>
+                        <a:effectLst/>
+                        <a:latin typeface="Calibri" panose="020F0502020204030204" pitchFamily="34" charset="0"/>
+                      </a:endParaRPr>
+                    </a:p>
+                  </a:txBody>
+                  <a:tcPr marL="9525" marR="9525" marT="9525" marB="0" anchor="b">
+                    <a:lnL w="12700" cap="flat" cmpd="sng" algn="ctr">
+                      <a:solidFill>
+                        <a:schemeClr val="tx1"/>
+                      </a:solidFill>
+                      <a:prstDash val="solid"/>
+                      <a:round/>
+                      <a:headEnd type="none" w="med" len="med"/>
+                      <a:tailEnd type="none" w="med" len="med"/>
+                    </a:lnL>
+                    <a:lnR w="12700" cap="flat" cmpd="sng" algn="ctr">
+                      <a:solidFill>
+                        <a:schemeClr val="tx1"/>
+                      </a:solidFill>
+                      <a:prstDash val="solid"/>
+                      <a:round/>
+                      <a:headEnd type="none" w="med" len="med"/>
+                      <a:tailEnd type="none" w="med" len="med"/>
+                    </a:lnR>
+                    <a:lnT w="12700" cap="flat" cmpd="sng" algn="ctr">
+                      <a:solidFill>
+                        <a:schemeClr val="tx1"/>
+                      </a:solidFill>
+                      <a:prstDash val="solid"/>
+                      <a:round/>
+                      <a:headEnd type="none" w="med" len="med"/>
+                      <a:tailEnd type="none" w="med" len="med"/>
+                    </a:lnT>
+                    <a:lnB w="12700" cap="flat" cmpd="sng" algn="ctr">
+                      <a:solidFill>
+                        <a:schemeClr val="tx1"/>
+                      </a:solidFill>
+                      <a:prstDash val="solid"/>
+                      <a:round/>
+                      <a:headEnd type="none" w="med" len="med"/>
+                      <a:tailEnd type="none" w="med" len="med"/>
+                    </a:lnB>
+                  </a:tcPr>
+                </a:tc>
+                <a:tc>
+                  <a:txBody>
+                    <a:bodyPr/>
+                    <a:lstStyle/>
+                    <a:p>
+                      <a:pPr algn="l" fontAlgn="b"/>
+                      <a:endParaRPr lang="tr-TR" sz="1600" b="0" i="0" u="none" strike="noStrike">
+                        <a:solidFill>
+                          <a:srgbClr val="000000"/>
+                        </a:solidFill>
+                        <a:effectLst/>
+                        <a:latin typeface="Calibri" panose="020F0502020204030204" pitchFamily="34" charset="0"/>
+                      </a:endParaRPr>
+                    </a:p>
+                  </a:txBody>
+                  <a:tcPr marL="9525" marR="9525" marT="9525" marB="0" anchor="b">
+                    <a:lnL w="12700" cap="flat" cmpd="sng" algn="ctr">
+                      <a:solidFill>
+                        <a:schemeClr val="tx1"/>
+                      </a:solidFill>
+                      <a:prstDash val="solid"/>
+                      <a:round/>
+                      <a:headEnd type="none" w="med" len="med"/>
+                      <a:tailEnd type="none" w="med" len="med"/>
+                    </a:lnL>
+                    <a:lnR w="12700" cap="flat" cmpd="sng" algn="ctr">
+                      <a:solidFill>
+                        <a:schemeClr val="tx1"/>
+                      </a:solidFill>
+                      <a:prstDash val="solid"/>
+                      <a:round/>
+                      <a:headEnd type="none" w="med" len="med"/>
+                      <a:tailEnd type="none" w="med" len="med"/>
+                    </a:lnR>
+                  </a:tcPr>
+                </a:tc>
+                <a:tc>
+                  <a:txBody>
+                    <a:bodyPr/>
+                    <a:lstStyle/>
+                    <a:p>
+                      <a:pPr algn="l" fontAlgn="b"/>
+                      <a:r>
+                        <a:rPr lang="tr-TR" sz="1600" u="none" strike="noStrike">
+                          <a:effectLst/>
+                        </a:rPr>
+                        <a:t>Precision</a:t>
+                      </a:r>
+                      <a:endParaRPr lang="tr-TR" sz="1600" b="0" i="0" u="none" strike="noStrike">
+                        <a:solidFill>
+                          <a:srgbClr val="000000"/>
+                        </a:solidFill>
+                        <a:effectLst/>
+                        <a:latin typeface="Calibri" panose="020F0502020204030204" pitchFamily="34" charset="0"/>
+                      </a:endParaRPr>
+                    </a:p>
+                  </a:txBody>
+                  <a:tcPr marL="9525" marR="9525" marT="9525" marB="0" anchor="b">
+                    <a:lnL w="12700" cap="flat" cmpd="sng" algn="ctr">
+                      <a:solidFill>
+                        <a:schemeClr val="tx1"/>
+                      </a:solidFill>
+                      <a:prstDash val="solid"/>
+                      <a:round/>
+                      <a:headEnd type="none" w="med" len="med"/>
+                      <a:tailEnd type="none" w="med" len="med"/>
+                    </a:lnL>
+                    <a:lnR w="12700" cap="flat" cmpd="sng" algn="ctr">
+                      <a:solidFill>
+                        <a:schemeClr val="tx1"/>
+                      </a:solidFill>
+                      <a:prstDash val="solid"/>
+                      <a:round/>
+                      <a:headEnd type="none" w="med" len="med"/>
+                      <a:tailEnd type="none" w="med" len="med"/>
+                    </a:lnR>
+                    <a:lnT w="12700" cap="flat" cmpd="sng" algn="ctr">
+                      <a:solidFill>
+                        <a:schemeClr val="tx1"/>
+                      </a:solidFill>
+                      <a:prstDash val="solid"/>
+                      <a:round/>
+                      <a:headEnd type="none" w="med" len="med"/>
+                      <a:tailEnd type="none" w="med" len="med"/>
+                    </a:lnT>
+                    <a:lnB w="12700" cap="flat" cmpd="sng" algn="ctr">
+                      <a:solidFill>
+                        <a:schemeClr val="tx1"/>
+                      </a:solidFill>
+                      <a:prstDash val="solid"/>
+                      <a:round/>
+                      <a:headEnd type="none" w="med" len="med"/>
+                      <a:tailEnd type="none" w="med" len="med"/>
+                    </a:lnB>
+                  </a:tcPr>
+                </a:tc>
+                <a:tc>
+                  <a:txBody>
+                    <a:bodyPr/>
+                    <a:lstStyle/>
+                    <a:p>
+                      <a:pPr algn="r" fontAlgn="b"/>
+                      <a:r>
+                        <a:rPr lang="tr-TR" sz="1600" u="none" strike="noStrike" dirty="0">
+                          <a:effectLst/>
+                        </a:rPr>
+                        <a:t>1,0000</a:t>
+                      </a:r>
+                      <a:endParaRPr lang="tr-TR" sz="1600" b="0" i="0" u="none" strike="noStrike" dirty="0">
+                        <a:solidFill>
+                          <a:srgbClr val="000000"/>
+                        </a:solidFill>
+                        <a:effectLst/>
+                        <a:latin typeface="Calibri" panose="020F0502020204030204" pitchFamily="34" charset="0"/>
+                      </a:endParaRPr>
+                    </a:p>
+                  </a:txBody>
+                  <a:tcPr marL="9525" marR="9525" marT="9525" marB="0" anchor="b">
+                    <a:lnL w="12700" cap="flat" cmpd="sng" algn="ctr">
+                      <a:solidFill>
+                        <a:schemeClr val="tx1"/>
+                      </a:solidFill>
+                      <a:prstDash val="solid"/>
+                      <a:round/>
+                      <a:headEnd type="none" w="med" len="med"/>
+                      <a:tailEnd type="none" w="med" len="med"/>
+                    </a:lnL>
+                    <a:lnR w="12700" cap="flat" cmpd="sng" algn="ctr">
+                      <a:solidFill>
+                        <a:schemeClr val="tx1"/>
+                      </a:solidFill>
+                      <a:prstDash val="solid"/>
+                      <a:round/>
+                      <a:headEnd type="none" w="med" len="med"/>
+                      <a:tailEnd type="none" w="med" len="med"/>
+                    </a:lnR>
+                    <a:lnT w="12700" cap="flat" cmpd="sng" algn="ctr">
+                      <a:solidFill>
+                        <a:schemeClr val="tx1"/>
+                      </a:solidFill>
+                      <a:prstDash val="solid"/>
+                      <a:round/>
+                      <a:headEnd type="none" w="med" len="med"/>
+                      <a:tailEnd type="none" w="med" len="med"/>
+                    </a:lnT>
+                    <a:lnB w="12700" cap="flat" cmpd="sng" algn="ctr">
+                      <a:solidFill>
+                        <a:schemeClr val="tx1"/>
+                      </a:solidFill>
+                      <a:prstDash val="solid"/>
+                      <a:round/>
+                      <a:headEnd type="none" w="med" len="med"/>
+                      <a:tailEnd type="none" w="med" len="med"/>
+                    </a:lnB>
+                  </a:tcPr>
+                </a:tc>
+                <a:extLst>
+                  <a:ext uri="{0D108BD9-81ED-4DB2-BD59-A6C34878D82A}">
+                    <a16:rowId xmlns:a16="http://schemas.microsoft.com/office/drawing/2014/main" val="3365148302"/>
+                  </a:ext>
+                </a:extLst>
+              </a:tr>
+              <a:tr h="267050">
+                <a:tc>
+                  <a:txBody>
+                    <a:bodyPr/>
+                    <a:lstStyle/>
+                    <a:p>
+                      <a:pPr algn="l" fontAlgn="b"/>
+                      <a:r>
+                        <a:rPr lang="tr-TR" sz="1600" u="none" strike="noStrike">
+                          <a:effectLst/>
+                        </a:rPr>
+                        <a:t>Recall</a:t>
+                      </a:r>
+                      <a:endParaRPr lang="tr-TR" sz="1600" b="0" i="0" u="none" strike="noStrike">
+                        <a:solidFill>
+                          <a:srgbClr val="000000"/>
+                        </a:solidFill>
+                        <a:effectLst/>
+                        <a:latin typeface="Calibri" panose="020F0502020204030204" pitchFamily="34" charset="0"/>
+                      </a:endParaRPr>
+                    </a:p>
+                  </a:txBody>
+                  <a:tcPr marL="9525" marR="9525" marT="9525" marB="0" anchor="b">
+                    <a:lnL w="12700" cap="flat" cmpd="sng" algn="ctr">
+                      <a:solidFill>
+                        <a:schemeClr val="tx1"/>
+                      </a:solidFill>
+                      <a:prstDash val="solid"/>
+                      <a:round/>
+                      <a:headEnd type="none" w="med" len="med"/>
+                      <a:tailEnd type="none" w="med" len="med"/>
+                    </a:lnL>
+                    <a:lnR w="12700" cap="flat" cmpd="sng" algn="ctr">
+                      <a:solidFill>
+                        <a:schemeClr val="tx1"/>
+                      </a:solidFill>
+                      <a:prstDash val="solid"/>
+                      <a:round/>
+                      <a:headEnd type="none" w="med" len="med"/>
+                      <a:tailEnd type="none" w="med" len="med"/>
+                    </a:lnR>
+                    <a:lnT w="12700" cap="flat" cmpd="sng" algn="ctr">
+                      <a:solidFill>
+                        <a:schemeClr val="tx1"/>
+                      </a:solidFill>
+                      <a:prstDash val="solid"/>
+                      <a:round/>
+                      <a:headEnd type="none" w="med" len="med"/>
+                      <a:tailEnd type="none" w="med" len="med"/>
+                    </a:lnT>
+                    <a:lnB w="12700" cap="flat" cmpd="sng" algn="ctr">
+                      <a:solidFill>
+                        <a:schemeClr val="tx1"/>
+                      </a:solidFill>
+                      <a:prstDash val="solid"/>
+                      <a:round/>
+                      <a:headEnd type="none" w="med" len="med"/>
+                      <a:tailEnd type="none" w="med" len="med"/>
+                    </a:lnB>
+                  </a:tcPr>
+                </a:tc>
+                <a:tc>
+                  <a:txBody>
+                    <a:bodyPr/>
+                    <a:lstStyle/>
+                    <a:p>
+                      <a:pPr algn="r" fontAlgn="b"/>
+                      <a:r>
+                        <a:rPr lang="tr-TR" sz="1600" u="none" strike="noStrike" dirty="0">
+                          <a:effectLst/>
+                        </a:rPr>
+                        <a:t>0,9000</a:t>
+                      </a:r>
+                      <a:endParaRPr lang="tr-TR" sz="1600" b="0" i="0" u="none" strike="noStrike" dirty="0">
+                        <a:solidFill>
+                          <a:srgbClr val="000000"/>
+                        </a:solidFill>
+                        <a:effectLst/>
+                        <a:latin typeface="Calibri" panose="020F0502020204030204" pitchFamily="34" charset="0"/>
+                      </a:endParaRPr>
+                    </a:p>
+                  </a:txBody>
+                  <a:tcPr marL="9525" marR="9525" marT="9525" marB="0" anchor="b">
+                    <a:lnL w="12700" cap="flat" cmpd="sng" algn="ctr">
+                      <a:solidFill>
+                        <a:schemeClr val="tx1"/>
+                      </a:solidFill>
+                      <a:prstDash val="solid"/>
+                      <a:round/>
+                      <a:headEnd type="none" w="med" len="med"/>
+                      <a:tailEnd type="none" w="med" len="med"/>
+                    </a:lnL>
+                    <a:lnR w="12700" cap="flat" cmpd="sng" algn="ctr">
+                      <a:solidFill>
+                        <a:schemeClr val="tx1"/>
+                      </a:solidFill>
+                      <a:prstDash val="solid"/>
+                      <a:round/>
+                      <a:headEnd type="none" w="med" len="med"/>
+                      <a:tailEnd type="none" w="med" len="med"/>
+                    </a:lnR>
+                    <a:lnT w="12700" cap="flat" cmpd="sng" algn="ctr">
+                      <a:solidFill>
+                        <a:schemeClr val="tx1"/>
+                      </a:solidFill>
+                      <a:prstDash val="solid"/>
+                      <a:round/>
+                      <a:headEnd type="none" w="med" len="med"/>
+                      <a:tailEnd type="none" w="med" len="med"/>
+                    </a:lnT>
+                    <a:lnB w="12700" cap="flat" cmpd="sng" algn="ctr">
+                      <a:solidFill>
+                        <a:schemeClr val="tx1"/>
+                      </a:solidFill>
+                      <a:prstDash val="solid"/>
+                      <a:round/>
+                      <a:headEnd type="none" w="med" len="med"/>
+                      <a:tailEnd type="none" w="med" len="med"/>
+                    </a:lnB>
+                  </a:tcPr>
+                </a:tc>
+                <a:tc>
+                  <a:txBody>
+                    <a:bodyPr/>
+                    <a:lstStyle/>
+                    <a:p>
+                      <a:pPr algn="l" fontAlgn="b"/>
+                      <a:endParaRPr lang="tr-TR" sz="1600" b="0" i="0" u="none" strike="noStrike" dirty="0">
+                        <a:solidFill>
+                          <a:srgbClr val="000000"/>
+                        </a:solidFill>
+                        <a:effectLst/>
+                        <a:latin typeface="Calibri" panose="020F0502020204030204" pitchFamily="34" charset="0"/>
+                      </a:endParaRPr>
+                    </a:p>
+                  </a:txBody>
+                  <a:tcPr marL="9525" marR="9525" marT="9525" marB="0" anchor="b">
+                    <a:lnL w="12700" cap="flat" cmpd="sng" algn="ctr">
+                      <a:solidFill>
+                        <a:schemeClr val="tx1"/>
+                      </a:solidFill>
+                      <a:prstDash val="solid"/>
+                      <a:round/>
+                      <a:headEnd type="none" w="med" len="med"/>
+                      <a:tailEnd type="none" w="med" len="med"/>
+                    </a:lnL>
+                    <a:lnR w="12700" cap="flat" cmpd="sng" algn="ctr">
+                      <a:solidFill>
+                        <a:schemeClr val="tx1"/>
+                      </a:solidFill>
+                      <a:prstDash val="solid"/>
+                      <a:round/>
+                      <a:headEnd type="none" w="med" len="med"/>
+                      <a:tailEnd type="none" w="med" len="med"/>
+                    </a:lnR>
+                  </a:tcPr>
+                </a:tc>
+                <a:tc>
+                  <a:txBody>
+                    <a:bodyPr/>
+                    <a:lstStyle/>
+                    <a:p>
+                      <a:pPr algn="l" fontAlgn="b"/>
+                      <a:r>
+                        <a:rPr lang="tr-TR" sz="1600" u="none" strike="noStrike">
+                          <a:effectLst/>
+                        </a:rPr>
+                        <a:t>Recall</a:t>
+                      </a:r>
+                      <a:endParaRPr lang="tr-TR" sz="1600" b="0" i="0" u="none" strike="noStrike">
+                        <a:solidFill>
+                          <a:srgbClr val="000000"/>
+                        </a:solidFill>
+                        <a:effectLst/>
+                        <a:latin typeface="Calibri" panose="020F0502020204030204" pitchFamily="34" charset="0"/>
+                      </a:endParaRPr>
+                    </a:p>
+                  </a:txBody>
+                  <a:tcPr marL="9525" marR="9525" marT="9525" marB="0" anchor="b">
+                    <a:lnL w="12700" cap="flat" cmpd="sng" algn="ctr">
+                      <a:solidFill>
+                        <a:schemeClr val="tx1"/>
+                      </a:solidFill>
+                      <a:prstDash val="solid"/>
+                      <a:round/>
+                      <a:headEnd type="none" w="med" len="med"/>
+                      <a:tailEnd type="none" w="med" len="med"/>
+                    </a:lnL>
+                    <a:lnR w="12700" cap="flat" cmpd="sng" algn="ctr">
+                      <a:solidFill>
+                        <a:schemeClr val="tx1"/>
+                      </a:solidFill>
+                      <a:prstDash val="solid"/>
+                      <a:round/>
+                      <a:headEnd type="none" w="med" len="med"/>
+                      <a:tailEnd type="none" w="med" len="med"/>
+                    </a:lnR>
+                    <a:lnT w="12700" cap="flat" cmpd="sng" algn="ctr">
+                      <a:solidFill>
+                        <a:schemeClr val="tx1"/>
+                      </a:solidFill>
+                      <a:prstDash val="solid"/>
+                      <a:round/>
+                      <a:headEnd type="none" w="med" len="med"/>
+                      <a:tailEnd type="none" w="med" len="med"/>
+                    </a:lnT>
+                    <a:lnB w="12700" cap="flat" cmpd="sng" algn="ctr">
+                      <a:solidFill>
+                        <a:schemeClr val="tx1"/>
+                      </a:solidFill>
+                      <a:prstDash val="solid"/>
+                      <a:round/>
+                      <a:headEnd type="none" w="med" len="med"/>
+                      <a:tailEnd type="none" w="med" len="med"/>
+                    </a:lnB>
+                  </a:tcPr>
+                </a:tc>
+                <a:tc>
+                  <a:txBody>
+                    <a:bodyPr/>
+                    <a:lstStyle/>
+                    <a:p>
+                      <a:pPr algn="r" fontAlgn="b"/>
+                      <a:r>
+                        <a:rPr lang="tr-TR" sz="1600" u="none" strike="noStrike" dirty="0">
+                          <a:effectLst/>
+                        </a:rPr>
+                        <a:t>1,0000</a:t>
+                      </a:r>
+                      <a:endParaRPr lang="tr-TR" sz="1600" b="0" i="0" u="none" strike="noStrike" dirty="0">
+                        <a:solidFill>
+                          <a:srgbClr val="000000"/>
+                        </a:solidFill>
+                        <a:effectLst/>
+                        <a:latin typeface="Calibri" panose="020F0502020204030204" pitchFamily="34" charset="0"/>
+                      </a:endParaRPr>
+                    </a:p>
+                  </a:txBody>
+                  <a:tcPr marL="9525" marR="9525" marT="9525" marB="0" anchor="b">
+                    <a:lnL w="12700" cap="flat" cmpd="sng" algn="ctr">
+                      <a:solidFill>
+                        <a:schemeClr val="tx1"/>
+                      </a:solidFill>
+                      <a:prstDash val="solid"/>
+                      <a:round/>
+                      <a:headEnd type="none" w="med" len="med"/>
+                      <a:tailEnd type="none" w="med" len="med"/>
+                    </a:lnL>
+                    <a:lnR w="12700" cap="flat" cmpd="sng" algn="ctr">
+                      <a:solidFill>
+                        <a:schemeClr val="tx1"/>
+                      </a:solidFill>
+                      <a:prstDash val="solid"/>
+                      <a:round/>
+                      <a:headEnd type="none" w="med" len="med"/>
+                      <a:tailEnd type="none" w="med" len="med"/>
+                    </a:lnR>
+                    <a:lnT w="12700" cap="flat" cmpd="sng" algn="ctr">
+                      <a:solidFill>
+                        <a:schemeClr val="tx1"/>
+                      </a:solidFill>
+                      <a:prstDash val="solid"/>
+                      <a:round/>
+                      <a:headEnd type="none" w="med" len="med"/>
+                      <a:tailEnd type="none" w="med" len="med"/>
+                    </a:lnT>
+                    <a:lnB w="12700" cap="flat" cmpd="sng" algn="ctr">
+                      <a:solidFill>
+                        <a:schemeClr val="tx1"/>
+                      </a:solidFill>
+                      <a:prstDash val="solid"/>
+                      <a:round/>
+                      <a:headEnd type="none" w="med" len="med"/>
+                      <a:tailEnd type="none" w="med" len="med"/>
+                    </a:lnB>
+                  </a:tcPr>
+                </a:tc>
+                <a:tc>
+                  <a:txBody>
+                    <a:bodyPr/>
+                    <a:lstStyle/>
+                    <a:p>
+                      <a:pPr algn="l" fontAlgn="b"/>
+                      <a:endParaRPr lang="tr-TR" sz="1600" b="0" i="0" u="none" strike="noStrike">
+                        <a:solidFill>
+                          <a:srgbClr val="000000"/>
+                        </a:solidFill>
+                        <a:effectLst/>
+                        <a:latin typeface="Calibri" panose="020F0502020204030204" pitchFamily="34" charset="0"/>
+                      </a:endParaRPr>
+                    </a:p>
+                  </a:txBody>
+                  <a:tcPr marL="9525" marR="9525" marT="9525" marB="0" anchor="b">
+                    <a:lnL w="12700" cap="flat" cmpd="sng" algn="ctr">
+                      <a:solidFill>
+                        <a:schemeClr val="tx1"/>
+                      </a:solidFill>
+                      <a:prstDash val="solid"/>
+                      <a:round/>
+                      <a:headEnd type="none" w="med" len="med"/>
+                      <a:tailEnd type="none" w="med" len="med"/>
+                    </a:lnL>
+                    <a:lnR w="12700" cap="flat" cmpd="sng" algn="ctr">
+                      <a:solidFill>
+                        <a:schemeClr val="tx1"/>
+                      </a:solidFill>
+                      <a:prstDash val="solid"/>
+                      <a:round/>
+                      <a:headEnd type="none" w="med" len="med"/>
+                      <a:tailEnd type="none" w="med" len="med"/>
+                    </a:lnR>
+                  </a:tcPr>
+                </a:tc>
+                <a:tc>
+                  <a:txBody>
+                    <a:bodyPr/>
+                    <a:lstStyle/>
+                    <a:p>
+                      <a:pPr algn="l" fontAlgn="b"/>
+                      <a:r>
+                        <a:rPr lang="tr-TR" sz="1600" u="none" strike="noStrike">
+                          <a:effectLst/>
+                        </a:rPr>
+                        <a:t>Recall</a:t>
+                      </a:r>
+                      <a:endParaRPr lang="tr-TR" sz="1600" b="0" i="0" u="none" strike="noStrike">
+                        <a:solidFill>
+                          <a:srgbClr val="000000"/>
+                        </a:solidFill>
+                        <a:effectLst/>
+                        <a:latin typeface="Calibri" panose="020F0502020204030204" pitchFamily="34" charset="0"/>
+                      </a:endParaRPr>
+                    </a:p>
+                  </a:txBody>
+                  <a:tcPr marL="9525" marR="9525" marT="9525" marB="0" anchor="b">
+                    <a:lnL w="12700" cap="flat" cmpd="sng" algn="ctr">
+                      <a:solidFill>
+                        <a:schemeClr val="tx1"/>
+                      </a:solidFill>
+                      <a:prstDash val="solid"/>
+                      <a:round/>
+                      <a:headEnd type="none" w="med" len="med"/>
+                      <a:tailEnd type="none" w="med" len="med"/>
+                    </a:lnL>
+                    <a:lnR w="12700" cap="flat" cmpd="sng" algn="ctr">
+                      <a:solidFill>
+                        <a:schemeClr val="tx1"/>
+                      </a:solidFill>
+                      <a:prstDash val="solid"/>
+                      <a:round/>
+                      <a:headEnd type="none" w="med" len="med"/>
+                      <a:tailEnd type="none" w="med" len="med"/>
+                    </a:lnR>
+                    <a:lnT w="12700" cap="flat" cmpd="sng" algn="ctr">
+                      <a:solidFill>
+                        <a:schemeClr val="tx1"/>
+                      </a:solidFill>
+                      <a:prstDash val="solid"/>
+                      <a:round/>
+                      <a:headEnd type="none" w="med" len="med"/>
+                      <a:tailEnd type="none" w="med" len="med"/>
+                    </a:lnT>
+                    <a:lnB w="12700" cap="flat" cmpd="sng" algn="ctr">
+                      <a:solidFill>
+                        <a:schemeClr val="tx1"/>
+                      </a:solidFill>
+                      <a:prstDash val="solid"/>
+                      <a:round/>
+                      <a:headEnd type="none" w="med" len="med"/>
+                      <a:tailEnd type="none" w="med" len="med"/>
+                    </a:lnB>
+                  </a:tcPr>
+                </a:tc>
+                <a:tc>
+                  <a:txBody>
+                    <a:bodyPr/>
+                    <a:lstStyle/>
+                    <a:p>
+                      <a:pPr algn="r" fontAlgn="b"/>
+                      <a:r>
+                        <a:rPr lang="tr-TR" sz="1600" u="none" strike="noStrike" dirty="0">
+                          <a:effectLst/>
+                        </a:rPr>
+                        <a:t>0,7000</a:t>
+                      </a:r>
+                      <a:endParaRPr lang="tr-TR" sz="1600" b="0" i="0" u="none" strike="noStrike" dirty="0">
+                        <a:solidFill>
+                          <a:srgbClr val="000000"/>
+                        </a:solidFill>
+                        <a:effectLst/>
+                        <a:latin typeface="Calibri" panose="020F0502020204030204" pitchFamily="34" charset="0"/>
+                      </a:endParaRPr>
+                    </a:p>
+                  </a:txBody>
+                  <a:tcPr marL="9525" marR="9525" marT="9525" marB="0" anchor="b">
+                    <a:lnL w="12700" cap="flat" cmpd="sng" algn="ctr">
+                      <a:solidFill>
+                        <a:schemeClr val="tx1"/>
+                      </a:solidFill>
+                      <a:prstDash val="solid"/>
+                      <a:round/>
+                      <a:headEnd type="none" w="med" len="med"/>
+                      <a:tailEnd type="none" w="med" len="med"/>
+                    </a:lnL>
+                    <a:lnR w="12700" cap="flat" cmpd="sng" algn="ctr">
+                      <a:solidFill>
+                        <a:schemeClr val="tx1"/>
+                      </a:solidFill>
+                      <a:prstDash val="solid"/>
+                      <a:round/>
+                      <a:headEnd type="none" w="med" len="med"/>
+                      <a:tailEnd type="none" w="med" len="med"/>
+                    </a:lnR>
+                    <a:lnT w="12700" cap="flat" cmpd="sng" algn="ctr">
+                      <a:solidFill>
+                        <a:schemeClr val="tx1"/>
+                      </a:solidFill>
+                      <a:prstDash val="solid"/>
+                      <a:round/>
+                      <a:headEnd type="none" w="med" len="med"/>
+                      <a:tailEnd type="none" w="med" len="med"/>
+                    </a:lnT>
+                    <a:lnB w="12700" cap="flat" cmpd="sng" algn="ctr">
+                      <a:solidFill>
+                        <a:schemeClr val="tx1"/>
+                      </a:solidFill>
+                      <a:prstDash val="solid"/>
+                      <a:round/>
+                      <a:headEnd type="none" w="med" len="med"/>
+                      <a:tailEnd type="none" w="med" len="med"/>
+                    </a:lnB>
+                  </a:tcPr>
+                </a:tc>
+                <a:extLst>
+                  <a:ext uri="{0D108BD9-81ED-4DB2-BD59-A6C34878D82A}">
+                    <a16:rowId xmlns:a16="http://schemas.microsoft.com/office/drawing/2014/main" val="2829015624"/>
+                  </a:ext>
+                </a:extLst>
+              </a:tr>
+              <a:tr h="267050">
+                <a:tc>
+                  <a:txBody>
+                    <a:bodyPr/>
+                    <a:lstStyle/>
+                    <a:p>
+                      <a:pPr algn="l" fontAlgn="b"/>
+                      <a:endParaRPr lang="tr-TR" sz="1600" b="0" i="0" u="none" strike="noStrike">
+                        <a:solidFill>
+                          <a:srgbClr val="000000"/>
+                        </a:solidFill>
+                        <a:effectLst/>
+                        <a:latin typeface="Calibri" panose="020F0502020204030204" pitchFamily="34" charset="0"/>
+                      </a:endParaRPr>
+                    </a:p>
+                  </a:txBody>
+                  <a:tcPr marL="9525" marR="9525" marT="9525" marB="0" anchor="b">
+                    <a:lnT w="12700" cap="flat" cmpd="sng" algn="ctr">
+                      <a:solidFill>
+                        <a:schemeClr val="tx1"/>
+                      </a:solidFill>
+                      <a:prstDash val="solid"/>
+                      <a:round/>
+                      <a:headEnd type="none" w="med" len="med"/>
+                      <a:tailEnd type="none" w="med" len="med"/>
+                    </a:lnT>
+                  </a:tcPr>
+                </a:tc>
+                <a:tc>
+                  <a:txBody>
+                    <a:bodyPr/>
+                    <a:lstStyle/>
+                    <a:p>
+                      <a:pPr algn="l" fontAlgn="b"/>
+                      <a:endParaRPr lang="tr-TR" sz="1600" b="0" i="0" u="none" strike="noStrike" dirty="0">
+                        <a:solidFill>
+                          <a:srgbClr val="000000"/>
+                        </a:solidFill>
+                        <a:effectLst/>
+                        <a:latin typeface="Calibri" panose="020F0502020204030204" pitchFamily="34" charset="0"/>
+                      </a:endParaRPr>
+                    </a:p>
+                  </a:txBody>
+                  <a:tcPr marL="9525" marR="9525" marT="9525" marB="0" anchor="b">
+                    <a:lnT w="12700" cap="flat" cmpd="sng" algn="ctr">
+                      <a:solidFill>
+                        <a:schemeClr val="tx1"/>
+                      </a:solidFill>
+                      <a:prstDash val="solid"/>
+                      <a:round/>
+                      <a:headEnd type="none" w="med" len="med"/>
+                      <a:tailEnd type="none" w="med" len="med"/>
+                    </a:lnT>
+                  </a:tcPr>
+                </a:tc>
+                <a:tc>
+                  <a:txBody>
+                    <a:bodyPr/>
+                    <a:lstStyle/>
+                    <a:p>
+                      <a:pPr algn="l" fontAlgn="b"/>
+                      <a:endParaRPr lang="tr-TR" sz="1600" b="0" i="0" u="none" strike="noStrike">
+                        <a:solidFill>
+                          <a:srgbClr val="000000"/>
+                        </a:solidFill>
+                        <a:effectLst/>
+                        <a:latin typeface="Calibri" panose="020F0502020204030204" pitchFamily="34" charset="0"/>
+                      </a:endParaRPr>
+                    </a:p>
+                  </a:txBody>
+                  <a:tcPr marL="9525" marR="9525" marT="9525" marB="0" anchor="b"/>
+                </a:tc>
+                <a:tc>
+                  <a:txBody>
+                    <a:bodyPr/>
+                    <a:lstStyle/>
+                    <a:p>
+                      <a:pPr algn="l" fontAlgn="b"/>
+                      <a:endParaRPr lang="tr-TR" sz="1600" b="0" i="0" u="none" strike="noStrike">
+                        <a:solidFill>
+                          <a:srgbClr val="000000"/>
+                        </a:solidFill>
+                        <a:effectLst/>
+                        <a:latin typeface="Calibri" panose="020F0502020204030204" pitchFamily="34" charset="0"/>
+                      </a:endParaRPr>
+                    </a:p>
+                  </a:txBody>
+                  <a:tcPr marL="9525" marR="9525" marT="9525" marB="0" anchor="b">
+                    <a:lnT w="12700" cap="flat" cmpd="sng" algn="ctr">
+                      <a:solidFill>
+                        <a:schemeClr val="tx1"/>
+                      </a:solidFill>
+                      <a:prstDash val="solid"/>
+                      <a:round/>
+                      <a:headEnd type="none" w="med" len="med"/>
+                      <a:tailEnd type="none" w="med" len="med"/>
+                    </a:lnT>
+                  </a:tcPr>
+                </a:tc>
+                <a:tc>
+                  <a:txBody>
+                    <a:bodyPr/>
+                    <a:lstStyle/>
+                    <a:p>
+                      <a:pPr algn="l" fontAlgn="b"/>
+                      <a:endParaRPr lang="tr-TR" sz="1600" b="0" i="0" u="none" strike="noStrike">
+                        <a:solidFill>
+                          <a:srgbClr val="000000"/>
+                        </a:solidFill>
+                        <a:effectLst/>
+                        <a:latin typeface="Calibri" panose="020F0502020204030204" pitchFamily="34" charset="0"/>
+                      </a:endParaRPr>
+                    </a:p>
+                  </a:txBody>
+                  <a:tcPr marL="9525" marR="9525" marT="9525" marB="0" anchor="b">
+                    <a:lnT w="12700" cap="flat" cmpd="sng" algn="ctr">
+                      <a:solidFill>
+                        <a:schemeClr val="tx1"/>
+                      </a:solidFill>
+                      <a:prstDash val="solid"/>
+                      <a:round/>
+                      <a:headEnd type="none" w="med" len="med"/>
+                      <a:tailEnd type="none" w="med" len="med"/>
+                    </a:lnT>
+                  </a:tcPr>
+                </a:tc>
+                <a:tc>
+                  <a:txBody>
+                    <a:bodyPr/>
+                    <a:lstStyle/>
+                    <a:p>
+                      <a:pPr algn="l" fontAlgn="b"/>
+                      <a:endParaRPr lang="tr-TR" sz="1600" b="0" i="0" u="none" strike="noStrike">
+                        <a:solidFill>
+                          <a:srgbClr val="000000"/>
+                        </a:solidFill>
+                        <a:effectLst/>
+                        <a:latin typeface="Calibri" panose="020F0502020204030204" pitchFamily="34" charset="0"/>
+                      </a:endParaRPr>
+                    </a:p>
+                  </a:txBody>
+                  <a:tcPr marL="9525" marR="9525" marT="9525" marB="0" anchor="b"/>
+                </a:tc>
+                <a:tc>
+                  <a:txBody>
+                    <a:bodyPr/>
+                    <a:lstStyle/>
+                    <a:p>
+                      <a:pPr algn="l" fontAlgn="b"/>
+                      <a:endParaRPr lang="tr-TR" sz="1600" b="0" i="0" u="none" strike="noStrike">
+                        <a:solidFill>
+                          <a:srgbClr val="000000"/>
+                        </a:solidFill>
+                        <a:effectLst/>
+                        <a:latin typeface="Calibri" panose="020F0502020204030204" pitchFamily="34" charset="0"/>
+                      </a:endParaRPr>
+                    </a:p>
+                  </a:txBody>
+                  <a:tcPr marL="9525" marR="9525" marT="9525" marB="0" anchor="b">
+                    <a:lnT w="12700" cap="flat" cmpd="sng" algn="ctr">
+                      <a:solidFill>
+                        <a:schemeClr val="tx1"/>
+                      </a:solidFill>
+                      <a:prstDash val="solid"/>
+                      <a:round/>
+                      <a:headEnd type="none" w="med" len="med"/>
+                      <a:tailEnd type="none" w="med" len="med"/>
+                    </a:lnT>
+                  </a:tcPr>
+                </a:tc>
+                <a:tc>
+                  <a:txBody>
+                    <a:bodyPr/>
+                    <a:lstStyle/>
+                    <a:p>
+                      <a:pPr algn="l" fontAlgn="b"/>
+                      <a:endParaRPr lang="tr-TR" sz="1600" b="0" i="0" u="none" strike="noStrike" dirty="0">
+                        <a:solidFill>
+                          <a:srgbClr val="000000"/>
+                        </a:solidFill>
+                        <a:effectLst/>
+                        <a:latin typeface="Calibri" panose="020F0502020204030204" pitchFamily="34" charset="0"/>
+                      </a:endParaRPr>
+                    </a:p>
+                  </a:txBody>
+                  <a:tcPr marL="9525" marR="9525" marT="9525" marB="0" anchor="b">
+                    <a:lnT w="12700" cap="flat" cmpd="sng" algn="ctr">
+                      <a:solidFill>
+                        <a:schemeClr val="tx1"/>
+                      </a:solidFill>
+                      <a:prstDash val="solid"/>
+                      <a:round/>
+                      <a:headEnd type="none" w="med" len="med"/>
+                      <a:tailEnd type="none" w="med" len="med"/>
+                    </a:lnT>
+                  </a:tcPr>
+                </a:tc>
+                <a:extLst>
+                  <a:ext uri="{0D108BD9-81ED-4DB2-BD59-A6C34878D82A}">
+                    <a16:rowId xmlns:a16="http://schemas.microsoft.com/office/drawing/2014/main" val="1162229910"/>
+                  </a:ext>
+                </a:extLst>
+              </a:tr>
+              <a:tr h="774443">
+                <a:tc gridSpan="2">
+                  <a:txBody>
+                    <a:bodyPr/>
+                    <a:lstStyle/>
+                    <a:p>
+                      <a:pPr algn="ctr" fontAlgn="b"/>
+                      <a:endParaRPr lang="tr-TR" sz="1600" b="0" i="0" u="none" strike="noStrike" dirty="0">
+                        <a:solidFill>
+                          <a:srgbClr val="000000"/>
+                        </a:solidFill>
+                        <a:effectLst/>
+                        <a:latin typeface="Calibri" panose="020F0502020204030204" pitchFamily="34" charset="0"/>
+                      </a:endParaRPr>
+                    </a:p>
+                  </a:txBody>
+                  <a:tcPr marL="9525" marR="9525" marT="9525" marB="0" anchor="b"/>
+                </a:tc>
+                <a:tc hMerge="1">
+                  <a:txBody>
+                    <a:bodyPr/>
+                    <a:lstStyle/>
+                    <a:p>
+                      <a:endParaRPr lang="tr-TR"/>
+                    </a:p>
+                  </a:txBody>
+                  <a:tcPr/>
+                </a:tc>
+                <a:tc>
+                  <a:txBody>
+                    <a:bodyPr/>
+                    <a:lstStyle/>
+                    <a:p>
+                      <a:pPr algn="l" fontAlgn="b"/>
+                      <a:endParaRPr lang="tr-TR" sz="1600" b="0" i="0" u="none" strike="noStrike">
+                        <a:solidFill>
+                          <a:srgbClr val="000000"/>
+                        </a:solidFill>
+                        <a:effectLst/>
+                        <a:latin typeface="Calibri" panose="020F0502020204030204" pitchFamily="34" charset="0"/>
+                      </a:endParaRPr>
+                    </a:p>
+                  </a:txBody>
+                  <a:tcPr marL="9525" marR="9525" marT="9525" marB="0" anchor="b"/>
+                </a:tc>
+                <a:tc gridSpan="2">
+                  <a:txBody>
+                    <a:bodyPr/>
+                    <a:lstStyle/>
+                    <a:p>
+                      <a:pPr algn="ctr" fontAlgn="b"/>
+                      <a:r>
+                        <a:rPr lang="tr-TR" sz="1600" u="none" strike="noStrike" dirty="0">
+                          <a:effectLst/>
+                        </a:rPr>
+                        <a:t>Mümkün olduğunca </a:t>
+                      </a:r>
+                      <a:br>
+                        <a:rPr lang="tr-TR" sz="1600" u="none" strike="noStrike" dirty="0">
+                          <a:effectLst/>
+                        </a:rPr>
+                      </a:br>
+                      <a:r>
+                        <a:rPr lang="tr-TR" sz="1600" u="none" strike="noStrike" dirty="0">
+                          <a:effectLst/>
+                        </a:rPr>
+                        <a:t>gerçek sınıfı bilme</a:t>
+                      </a:r>
+                      <a:endParaRPr lang="tr-TR" sz="1600" b="0" i="0" u="none" strike="noStrike" dirty="0">
+                        <a:solidFill>
+                          <a:srgbClr val="000000"/>
+                        </a:solidFill>
+                        <a:effectLst/>
+                        <a:latin typeface="Calibri" panose="020F0502020204030204" pitchFamily="34" charset="0"/>
+                      </a:endParaRPr>
+                    </a:p>
+                  </a:txBody>
+                  <a:tcPr marL="9525" marR="9525" marT="9525" marB="0" anchor="b"/>
+                </a:tc>
+                <a:tc hMerge="1">
+                  <a:txBody>
+                    <a:bodyPr/>
+                    <a:lstStyle/>
+                    <a:p>
+                      <a:endParaRPr lang="tr-TR"/>
+                    </a:p>
+                  </a:txBody>
+                  <a:tcPr/>
+                </a:tc>
+                <a:tc>
+                  <a:txBody>
+                    <a:bodyPr/>
+                    <a:lstStyle/>
+                    <a:p>
+                      <a:pPr algn="l" fontAlgn="b"/>
+                      <a:endParaRPr lang="tr-TR" sz="1600" b="0" i="0" u="none" strike="noStrike">
+                        <a:solidFill>
+                          <a:srgbClr val="000000"/>
+                        </a:solidFill>
+                        <a:effectLst/>
+                        <a:latin typeface="Calibri" panose="020F0502020204030204" pitchFamily="34" charset="0"/>
+                      </a:endParaRPr>
+                    </a:p>
+                  </a:txBody>
+                  <a:tcPr marL="9525" marR="9525" marT="9525" marB="0" anchor="b"/>
+                </a:tc>
+                <a:tc gridSpan="2">
+                  <a:txBody>
+                    <a:bodyPr/>
+                    <a:lstStyle/>
+                    <a:p>
+                      <a:pPr algn="ctr" fontAlgn="b"/>
+                      <a:r>
+                        <a:rPr lang="tr-TR" sz="1600" u="none" strike="noStrike" dirty="0">
+                          <a:effectLst/>
+                        </a:rPr>
+                        <a:t>Hata yapmayalım </a:t>
+                      </a:r>
+                      <a:br>
+                        <a:rPr lang="tr-TR" sz="1600" u="none" strike="noStrike" dirty="0">
+                          <a:effectLst/>
+                        </a:rPr>
+                      </a:br>
+                      <a:r>
+                        <a:rPr lang="tr-TR" sz="1600" u="none" strike="noStrike" dirty="0">
+                          <a:effectLst/>
+                        </a:rPr>
+                        <a:t>Yanlışa doğru demeyelim </a:t>
+                      </a:r>
+                      <a:endParaRPr lang="tr-TR" sz="1600" b="0" i="0" u="none" strike="noStrike" dirty="0">
+                        <a:solidFill>
+                          <a:srgbClr val="000000"/>
+                        </a:solidFill>
+                        <a:effectLst/>
+                        <a:latin typeface="Calibri" panose="020F0502020204030204" pitchFamily="34" charset="0"/>
+                      </a:endParaRPr>
+                    </a:p>
+                  </a:txBody>
+                  <a:tcPr marL="9525" marR="9525" marT="9525" marB="0" anchor="b"/>
+                </a:tc>
+                <a:tc hMerge="1">
+                  <a:txBody>
+                    <a:bodyPr/>
+                    <a:lstStyle/>
+                    <a:p>
+                      <a:endParaRPr lang="tr-TR"/>
+                    </a:p>
+                  </a:txBody>
+                  <a:tcPr/>
+                </a:tc>
+                <a:extLst>
+                  <a:ext uri="{0D108BD9-81ED-4DB2-BD59-A6C34878D82A}">
+                    <a16:rowId xmlns:a16="http://schemas.microsoft.com/office/drawing/2014/main" val="1567939760"/>
+                  </a:ext>
+                </a:extLst>
+              </a:tr>
+            </a:tbl>
+          </a:graphicData>
+        </a:graphic>
+      </p:graphicFrame>
+      <p:sp>
+        <p:nvSpPr>
+          <p:cNvPr id="3" name="Dikdörtgen 2">
+            <a:extLst>
+              <a:ext uri="{FF2B5EF4-FFF2-40B4-BE49-F238E27FC236}">
+                <a16:creationId xmlns:a16="http://schemas.microsoft.com/office/drawing/2014/main" id="{BB33D6B0-5035-41FA-9C26-DB60FE9D5DB6}"/>
+              </a:ext>
+            </a:extLst>
+          </p:cNvPr>
+          <p:cNvSpPr/>
+          <p:nvPr/>
+        </p:nvSpPr>
+        <p:spPr>
+          <a:xfrm>
+            <a:off x="1962214" y="4636701"/>
+            <a:ext cx="7725769" cy="646331"/>
+          </a:xfrm>
+          <a:prstGeom prst="rect">
+            <a:avLst/>
+          </a:prstGeom>
+        </p:spPr>
+        <p:txBody>
+          <a:bodyPr wrap="none">
+            <a:spAutoFit/>
+          </a:bodyPr>
+          <a:lstStyle/>
+          <a:p>
+            <a:r>
+              <a:rPr lang="tr-TR" dirty="0"/>
+              <a:t>Bankanın online bankacılık işlemlerinde sahteci tespit etmeye çalıştığını düşünün</a:t>
+            </a:r>
+          </a:p>
+          <a:p>
+            <a:r>
+              <a:rPr lang="tr-TR" dirty="0"/>
+              <a:t>Hangi eşik değerini kullanmak mantıklı?</a:t>
+            </a:r>
+          </a:p>
+        </p:txBody>
+      </p:sp>
     </p:spTree>
     <p:extLst>
       <p:ext uri="{BB962C8B-B14F-4D97-AF65-F5344CB8AC3E}">
         <p14:creationId xmlns:p14="http://schemas.microsoft.com/office/powerpoint/2010/main" val="3519768631"/>
+      </p:ext>
+    </p:extLst>
+  </p:cSld>
+  <p:clrMapOvr>
+    <a:masterClrMapping/>
+  </p:clrMapOvr>
+</p:sld>
+</file>
+
+<file path=ppt/slides/slide13.xml><?xml version="1.0" encoding="utf-8"?>
+<p:sld xmlns:a="http://schemas.openxmlformats.org/drawingml/2006/main" xmlns:r="http://schemas.openxmlformats.org/officeDocument/2006/relationships" xmlns:p="http://schemas.openxmlformats.org/presentationml/2006/main">
+  <p:cSld>
+    <p:spTree>
+      <p:nvGrpSpPr>
+        <p:cNvPr id="1" name=""/>
+        <p:cNvGrpSpPr/>
+        <p:nvPr/>
+      </p:nvGrpSpPr>
+      <p:grpSpPr>
+        <a:xfrm>
+          <a:off x="0" y="0"/>
+          <a:ext cx="0" cy="0"/>
+          <a:chOff x="0" y="0"/>
+          <a:chExt cx="0" cy="0"/>
+        </a:xfrm>
+      </p:grpSpPr>
+      <p:sp>
+        <p:nvSpPr>
+          <p:cNvPr id="9" name="Rectangle 7"/>
+          <p:cNvSpPr>
+            <a:spLocks noChangeArrowheads="1"/>
+          </p:cNvSpPr>
+          <p:nvPr/>
+        </p:nvSpPr>
+        <p:spPr bwMode="auto">
+          <a:xfrm>
+            <a:off x="1962214" y="286544"/>
+            <a:ext cx="8429625" cy="590931"/>
+          </a:xfrm>
+          <a:prstGeom prst="rect">
+            <a:avLst/>
+          </a:prstGeom>
+          <a:noFill/>
+          <a:ln>
+            <a:noFill/>
+          </a:ln>
+          <a:extLst>
+            <a:ext uri="{909E8E84-426E-40DD-AFC4-6F175D3DCCD1}">
+              <a14:hiddenFill xmlns:a14="http://schemas.microsoft.com/office/drawing/2010/main">
+                <a:solidFill>
+                  <a:srgbClr val="FFFFFF"/>
+                </a:solidFill>
+              </a14:hiddenFill>
+            </a:ext>
+            <a:ext uri="{91240B29-F687-4F45-9708-019B960494DF}">
+              <a14:hiddenLine xmlns:a14="http://schemas.microsoft.com/office/drawing/2010/main" w="9525">
+                <a:solidFill>
+                  <a:srgbClr val="000000"/>
+                </a:solidFill>
+                <a:miter lim="800000"/>
+                <a:headEnd/>
+                <a:tailEnd/>
+              </a14:hiddenLine>
+            </a:ext>
+          </a:extLst>
+        </p:spPr>
+        <p:txBody>
+          <a:bodyPr>
+            <a:spAutoFit/>
+          </a:bodyPr>
+          <a:lstStyle/>
+          <a:p>
+            <a:pPr marL="0" lvl="1" algn="ctr">
+              <a:lnSpc>
+                <a:spcPct val="90000"/>
+              </a:lnSpc>
+              <a:spcBef>
+                <a:spcPct val="0"/>
+              </a:spcBef>
+            </a:pPr>
+            <a:r>
+              <a:rPr lang="tr-TR" sz="3600" b="1" dirty="0">
+                <a:solidFill>
+                  <a:srgbClr val="CD1F26"/>
+                </a:solidFill>
+                <a:latin typeface="Arial" panose="020B0604020202020204" pitchFamily="34" charset="0"/>
+                <a:ea typeface="Verdana" panose="020B0604030504040204" pitchFamily="34" charset="0"/>
+                <a:cs typeface="Arial" panose="020B0604020202020204" pitchFamily="34" charset="0"/>
+              </a:rPr>
+              <a:t>Precision </a:t>
+            </a:r>
+            <a:r>
+              <a:rPr lang="tr-TR" sz="3600" b="1" dirty="0" err="1">
+                <a:solidFill>
+                  <a:srgbClr val="CD1F26"/>
+                </a:solidFill>
+                <a:latin typeface="Arial" panose="020B0604020202020204" pitchFamily="34" charset="0"/>
+                <a:ea typeface="Verdana" panose="020B0604030504040204" pitchFamily="34" charset="0"/>
+                <a:cs typeface="Arial" panose="020B0604020202020204" pitchFamily="34" charset="0"/>
+              </a:rPr>
+              <a:t>Recall</a:t>
+            </a:r>
+            <a:r>
+              <a:rPr lang="tr-TR" sz="3600" b="1" dirty="0">
+                <a:solidFill>
+                  <a:srgbClr val="CD1F26"/>
+                </a:solidFill>
+                <a:latin typeface="Arial" panose="020B0604020202020204" pitchFamily="34" charset="0"/>
+                <a:ea typeface="Verdana" panose="020B0604030504040204" pitchFamily="34" charset="0"/>
+                <a:cs typeface="Arial" panose="020B0604020202020204" pitchFamily="34" charset="0"/>
+              </a:rPr>
+              <a:t> Dengesi</a:t>
+            </a:r>
+          </a:p>
+        </p:txBody>
+      </p:sp>
+      <p:cxnSp>
+        <p:nvCxnSpPr>
+          <p:cNvPr id="5" name="Düz Bağlayıcı 4"/>
+          <p:cNvCxnSpPr/>
+          <p:nvPr/>
+        </p:nvCxnSpPr>
+        <p:spPr>
+          <a:xfrm>
+            <a:off x="270491" y="6187930"/>
+            <a:ext cx="11768671" cy="0"/>
+          </a:xfrm>
+          <a:prstGeom prst="line">
+            <a:avLst/>
+          </a:prstGeom>
+          <a:ln w="101600" cmpd="thickThin">
+            <a:solidFill>
+              <a:schemeClr val="accent1">
+                <a:lumMod val="75000"/>
+              </a:schemeClr>
+            </a:solidFill>
+          </a:ln>
+        </p:spPr>
+        <p:style>
+          <a:lnRef idx="1">
+            <a:schemeClr val="accent1"/>
+          </a:lnRef>
+          <a:fillRef idx="0">
+            <a:schemeClr val="accent1"/>
+          </a:fillRef>
+          <a:effectRef idx="0">
+            <a:schemeClr val="accent1"/>
+          </a:effectRef>
+          <a:fontRef idx="minor">
+            <a:schemeClr val="tx1"/>
+          </a:fontRef>
+        </p:style>
+      </p:cxnSp>
+      <p:pic>
+        <p:nvPicPr>
+          <p:cNvPr id="6" name="Resim 5">
+            <a:extLst>
+              <a:ext uri="{FF2B5EF4-FFF2-40B4-BE49-F238E27FC236}">
+                <a16:creationId xmlns:a16="http://schemas.microsoft.com/office/drawing/2014/main" id="{AD626512-9238-4E07-9121-3FA4470540E1}"/>
+              </a:ext>
+            </a:extLst>
+          </p:cNvPr>
+          <p:cNvPicPr>
+            <a:picLocks noChangeAspect="1"/>
+          </p:cNvPicPr>
+          <p:nvPr/>
+        </p:nvPicPr>
+        <p:blipFill>
+          <a:blip r:embed="rId2">
+            <a:extLst>
+              <a:ext uri="{28A0092B-C50C-407E-A947-70E740481C1C}">
+                <a14:useLocalDpi xmlns:a14="http://schemas.microsoft.com/office/drawing/2010/main" val="0"/>
+              </a:ext>
+            </a:extLst>
+          </a:blip>
+          <a:stretch>
+            <a:fillRect/>
+          </a:stretch>
+        </p:blipFill>
+        <p:spPr>
+          <a:xfrm>
+            <a:off x="1332088" y="1079217"/>
+            <a:ext cx="9687801" cy="4699565"/>
+          </a:xfrm>
+          <a:prstGeom prst="rect">
+            <a:avLst/>
+          </a:prstGeom>
+        </p:spPr>
+      </p:pic>
+    </p:spTree>
+    <p:extLst>
+      <p:ext uri="{BB962C8B-B14F-4D97-AF65-F5344CB8AC3E}">
+        <p14:creationId xmlns:p14="http://schemas.microsoft.com/office/powerpoint/2010/main" val="3643757531"/>
       </p:ext>
     </p:extLst>
   </p:cSld>
@@ -13645,6 +17648,55 @@
           </a:p>
         </p:txBody>
       </p:sp>
+      <p:sp>
+        <p:nvSpPr>
+          <p:cNvPr id="6" name="Dikdörtgen: Katlanmış Köşe 5">
+            <a:extLst>
+              <a:ext uri="{FF2B5EF4-FFF2-40B4-BE49-F238E27FC236}">
+                <a16:creationId xmlns:a16="http://schemas.microsoft.com/office/drawing/2014/main" id="{BCD00186-59A4-4D6E-9AC9-A459BE53984B}"/>
+              </a:ext>
+            </a:extLst>
+          </p:cNvPr>
+          <p:cNvSpPr/>
+          <p:nvPr/>
+        </p:nvSpPr>
+        <p:spPr>
+          <a:xfrm>
+            <a:off x="4841133" y="2381402"/>
+            <a:ext cx="1624613" cy="1322118"/>
+          </a:xfrm>
+          <a:prstGeom prst="foldedCorner">
+            <a:avLst/>
+          </a:prstGeom>
+        </p:spPr>
+        <p:style>
+          <a:lnRef idx="2">
+            <a:schemeClr val="accent4">
+              <a:shade val="50000"/>
+            </a:schemeClr>
+          </a:lnRef>
+          <a:fillRef idx="1">
+            <a:schemeClr val="accent4"/>
+          </a:fillRef>
+          <a:effectRef idx="0">
+            <a:schemeClr val="accent4"/>
+          </a:effectRef>
+          <a:fontRef idx="minor">
+            <a:schemeClr val="lt1"/>
+          </a:fontRef>
+        </p:style>
+        <p:txBody>
+          <a:bodyPr rtlCol="0" anchor="ctr"/>
+          <a:lstStyle/>
+          <a:p>
+            <a:pPr algn="ctr"/>
+            <a:r>
+              <a:rPr lang="tr-TR" dirty="0"/>
+              <a:t>MODEL</a:t>
+            </a:r>
+          </a:p>
+        </p:txBody>
+      </p:sp>
     </p:spTree>
     <p:extLst>
       <p:ext uri="{BB962C8B-B14F-4D97-AF65-F5344CB8AC3E}">
@@ -13819,7 +17871,7 @@
                             </p:stCondLst>
                             <p:childTnLst>
                               <p:par>
-                                <p:cTn id="14" presetID="53" presetClass="entr" presetSubtype="16" fill="hold" nodeType="clickEffect">
+                                <p:cTn id="14" presetID="10" presetClass="entr" presetSubtype="0" fill="hold" grpId="0" nodeType="clickEffect">
                                   <p:stCondLst>
                                     <p:cond delay="0"/>
                                   </p:stCondLst>
@@ -13827,6 +17879,112 @@
                                     <p:set>
                                       <p:cBhvr>
                                         <p:cTn id="15" dur="1" fill="hold">
+                                          <p:stCondLst>
+                                            <p:cond delay="0"/>
+                                          </p:stCondLst>
+                                        </p:cTn>
+                                        <p:tgtEl>
+                                          <p:spTgt spid="6"/>
+                                        </p:tgtEl>
+                                        <p:attrNameLst>
+                                          <p:attrName>style.visibility</p:attrName>
+                                        </p:attrNameLst>
+                                      </p:cBhvr>
+                                      <p:to>
+                                        <p:strVal val="visible"/>
+                                      </p:to>
+                                    </p:set>
+                                    <p:animEffect transition="in" filter="fade">
+                                      <p:cBhvr>
+                                        <p:cTn id="16" dur="500"/>
+                                        <p:tgtEl>
+                                          <p:spTgt spid="6"/>
+                                        </p:tgtEl>
+                                      </p:cBhvr>
+                                    </p:animEffect>
+                                  </p:childTnLst>
+                                </p:cTn>
+                              </p:par>
+                            </p:childTnLst>
+                          </p:cTn>
+                        </p:par>
+                      </p:childTnLst>
+                    </p:cTn>
+                  </p:par>
+                  <p:par>
+                    <p:cTn id="17" fill="hold">
+                      <p:stCondLst>
+                        <p:cond delay="indefinite"/>
+                      </p:stCondLst>
+                      <p:childTnLst>
+                        <p:par>
+                          <p:cTn id="18" fill="hold">
+                            <p:stCondLst>
+                              <p:cond delay="0"/>
+                            </p:stCondLst>
+                            <p:childTnLst>
+                              <p:par>
+                                <p:cTn id="19" presetID="10" presetClass="exit" presetSubtype="0" fill="hold" grpId="1" nodeType="clickEffect">
+                                  <p:stCondLst>
+                                    <p:cond delay="0"/>
+                                  </p:stCondLst>
+                                  <p:childTnLst>
+                                    <p:animEffect transition="out" filter="fade">
+                                      <p:cBhvr>
+                                        <p:cTn id="20" dur="500"/>
+                                        <p:tgtEl>
+                                          <p:spTgt spid="6"/>
+                                        </p:tgtEl>
+                                      </p:cBhvr>
+                                    </p:animEffect>
+                                    <p:set>
+                                      <p:cBhvr>
+                                        <p:cTn id="21" dur="1" fill="hold">
+                                          <p:stCondLst>
+                                            <p:cond delay="499"/>
+                                          </p:stCondLst>
+                                        </p:cTn>
+                                        <p:tgtEl>
+                                          <p:spTgt spid="6"/>
+                                        </p:tgtEl>
+                                        <p:attrNameLst>
+                                          <p:attrName>style.visibility</p:attrName>
+                                        </p:attrNameLst>
+                                      </p:cBhvr>
+                                      <p:to>
+                                        <p:strVal val="hidden"/>
+                                      </p:to>
+                                    </p:set>
+                                  </p:childTnLst>
+                                </p:cTn>
+                              </p:par>
+                            </p:childTnLst>
+                          </p:cTn>
+                        </p:par>
+                      </p:childTnLst>
+                    </p:cTn>
+                  </p:par>
+                  <p:par>
+                    <p:cTn id="22" fill="hold">
+                      <p:stCondLst>
+                        <p:cond delay="indefinite"/>
+                      </p:stCondLst>
+                      <p:childTnLst>
+                        <p:par>
+                          <p:cTn id="23" fill="hold">
+                            <p:stCondLst>
+                              <p:cond delay="0"/>
+                            </p:stCondLst>
+                            <p:childTnLst>
+                              <p:par>
+                                <p:cTn id="24" presetID="53" presetClass="entr" presetSubtype="16" fill="hold" nodeType="clickEffect">
+                                  <p:stCondLst>
+                                    <p:cond delay="0"/>
+                                  </p:stCondLst>
+                                  <p:childTnLst>
+                                    <p:set>
+                                      <p:cBhvr>
+                                        <p:cTn id="25" dur="1" fill="hold">
                                           <p:stCondLst>
                                             <p:cond delay="0"/>
                                           </p:stCondLst>
@@ -13844,7 +18002,7 @@
                                     </p:set>
                                     <p:anim calcmode="lin" valueType="num">
                                       <p:cBhvr>
-                                        <p:cTn id="16" dur="500" fill="hold"/>
+                                        <p:cTn id="26" dur="500" fill="hold"/>
                                         <p:tgtEl>
                                           <p:spTgt spid="84"/>
                                         </p:tgtEl>
@@ -13867,7 +18025,7 @@
                                     </p:anim>
                                     <p:anim calcmode="lin" valueType="num">
                                       <p:cBhvr>
-                                        <p:cTn id="17" dur="500" fill="hold"/>
+                                        <p:cTn id="27" dur="500" fill="hold"/>
                                         <p:tgtEl>
                                           <p:spTgt spid="84"/>
                                         </p:tgtEl>
@@ -13890,7 +18048,7 @@
                                     </p:anim>
                                     <p:animEffect transition="in" filter="fade">
                                       <p:cBhvr>
-                                        <p:cTn id="18" dur="500"/>
+                                        <p:cTn id="28" dur="500"/>
                                         <p:tgtEl>
                                           <p:spTgt spid="84"/>
                                         </p:tgtEl>
@@ -13903,20 +18061,20 @@
                           </p:cTn>
                         </p:par>
                         <p:par>
-                          <p:cTn id="19" fill="hold">
+                          <p:cTn id="29" fill="hold">
                             <p:stCondLst>
                               <p:cond delay="500"/>
                             </p:stCondLst>
                             <p:childTnLst>
                               <p:par>
-                                <p:cTn id="20" presetID="0" presetClass="path" presetSubtype="0" accel="50000" decel="50000" fill="hold" nodeType="afterEffect">
+                                <p:cTn id="30" presetID="0" presetClass="path" presetSubtype="0" accel="50000" decel="50000" fill="hold" nodeType="afterEffect">
                                   <p:stCondLst>
                                     <p:cond delay="0"/>
                                   </p:stCondLst>
                                   <p:childTnLst>
                                     <p:animMotion origin="layout" path="M -1.04167E-6 4.07407E-6 L 0.3306 0.00579 " pathEditMode="relative" rAng="0" ptsTypes="AA">
                                       <p:cBhvr>
-                                        <p:cTn id="21" dur="2000" fill="hold"/>
+                                        <p:cTn id="31" dur="2000" fill="hold"/>
                                         <p:tgtEl>
                                           <p:spTgt spid="84"/>
                                         </p:tgtEl>
@@ -13934,20 +18092,20 @@
                           </p:cTn>
                         </p:par>
                         <p:par>
-                          <p:cTn id="22" fill="hold">
+                          <p:cTn id="32" fill="hold">
                             <p:stCondLst>
                               <p:cond delay="2500"/>
                             </p:stCondLst>
                             <p:childTnLst>
                               <p:par>
-                                <p:cTn id="23" presetID="53" presetClass="entr" presetSubtype="16" fill="hold" grpId="0" nodeType="afterEffect">
+                                <p:cTn id="33" presetID="53" presetClass="entr" presetSubtype="16" fill="hold" grpId="0" nodeType="afterEffect">
                                   <p:stCondLst>
                                     <p:cond delay="1000"/>
                                   </p:stCondLst>
                                   <p:childTnLst>
                                     <p:set>
                                       <p:cBhvr>
-                                        <p:cTn id="24" dur="1" fill="hold">
+                                        <p:cTn id="34" dur="1" fill="hold">
                                           <p:stCondLst>
                                             <p:cond delay="0"/>
                                           </p:stCondLst>
@@ -13965,7 +18123,7 @@
                                     </p:set>
                                     <p:anim calcmode="lin" valueType="num">
                                       <p:cBhvr>
-                                        <p:cTn id="25" dur="500" fill="hold"/>
+                                        <p:cTn id="35" dur="500" fill="hold"/>
                                         <p:tgtEl>
                                           <p:spTgt spid="7"/>
                                         </p:tgtEl>
@@ -13988,7 +18146,7 @@
                                     </p:anim>
                                     <p:anim calcmode="lin" valueType="num">
                                       <p:cBhvr>
-                                        <p:cTn id="26" dur="500" fill="hold"/>
+                                        <p:cTn id="36" dur="500" fill="hold"/>
                                         <p:tgtEl>
                                           <p:spTgt spid="7"/>
                                         </p:tgtEl>
@@ -14011,7 +18169,7 @@
                                     </p:anim>
                                     <p:animEffect transition="in" filter="fade">
                                       <p:cBhvr>
-                                        <p:cTn id="27" dur="500"/>
+                                        <p:cTn id="37" dur="500"/>
                                         <p:tgtEl>
                                           <p:spTgt spid="7"/>
                                         </p:tgtEl>
@@ -14049,6 +18207,8 @@
     </p:tnLst>
     <p:bldLst>
       <p:bldP spid="7" grpId="0" animBg="1"/>
+      <p:bldP spid="6" grpId="0" animBg="1"/>
+      <p:bldP spid="6" grpId="1" animBg="1"/>
     </p:bldLst>
   </p:timing>
 </p:sld>

</xml_diff>